<commit_message>
Completed DATEADD for side by side comparison of sales in a period
</commit_message>
<xml_diff>
--- a/dax-cheat-sheet-2/Microsoft PowerPoint Presentation.pptx
+++ b/dax-cheat-sheet-2/Microsoft PowerPoint Presentation.pptx
@@ -7,6 +7,8 @@
   <p:sldIdLst>
     <p:sldId id="256" r:id="rId2"/>
     <p:sldId id="257" r:id="rId3"/>
+    <p:sldId id="258" r:id="rId4"/>
+    <p:sldId id="259" r:id="rId5"/>
   </p:sldIdLst>
   <p:sldSz cx="12192000" cy="6858000"/>
   <p:notesSz cx="6858000" cy="9144000"/>
@@ -105,6 +107,11 @@
       </a:defRPr>
     </a:lvl9pPr>
   </p:defaultTextStyle>
+  <p:extLst>
+    <p:ext uri="{EFAFB233-063F-42B5-8137-9DF3F51BA10A}">
+      <p15:sldGuideLst xmlns:p15="http://schemas.microsoft.com/office/powerpoint/2012/main"/>
+    </p:ext>
+  </p:extLst>
 </p:presentation>
 </file>
 
@@ -3859,6 +3866,1123 @@
 </p:sld>
 </file>
 
+<file path=ppt/slides/slide3.xml><?xml version="1.0" encoding="utf-8"?>
+<p:sld xmlns:a="http://schemas.openxmlformats.org/drawingml/2006/main" xmlns:r="http://schemas.openxmlformats.org/officeDocument/2006/relationships" xmlns:p="http://schemas.openxmlformats.org/presentationml/2006/main">
+  <p:cSld>
+    <p:spTree>
+      <p:nvGrpSpPr>
+        <p:cNvPr id="1" name=""/>
+        <p:cNvGrpSpPr/>
+        <p:nvPr/>
+      </p:nvGrpSpPr>
+      <p:grpSpPr>
+        <a:xfrm>
+          <a:off x="0" y="0"/>
+          <a:ext cx="0" cy="0"/>
+          <a:chOff x="0" y="0"/>
+          <a:chExt cx="0" cy="0"/>
+        </a:xfrm>
+      </p:grpSpPr>
+      <p:pic>
+        <p:nvPicPr>
+          <p:cNvPr id="3" name="Picture 2">
+            <a:extLst>
+              <a:ext uri="{FF2B5EF4-FFF2-40B4-BE49-F238E27FC236}">
+                <a16:creationId xmlns:a16="http://schemas.microsoft.com/office/drawing/2014/main" id="{229D042D-2946-4302-B8C4-C2DD74D77FDE}"/>
+              </a:ext>
+            </a:extLst>
+          </p:cNvPr>
+          <p:cNvPicPr>
+            <a:picLocks noChangeAspect="1"/>
+          </p:cNvPicPr>
+          <p:nvPr/>
+        </p:nvPicPr>
+        <p:blipFill>
+          <a:blip r:embed="rId2"/>
+          <a:stretch>
+            <a:fillRect/>
+          </a:stretch>
+        </p:blipFill>
+        <p:spPr>
+          <a:xfrm>
+            <a:off x="1871662" y="152168"/>
+            <a:ext cx="8448675" cy="6429375"/>
+          </a:xfrm>
+          <a:prstGeom prst="rect">
+            <a:avLst/>
+          </a:prstGeom>
+        </p:spPr>
+      </p:pic>
+      <p:sp>
+        <p:nvSpPr>
+          <p:cNvPr id="4" name="TextBox 3">
+            <a:extLst>
+              <a:ext uri="{FF2B5EF4-FFF2-40B4-BE49-F238E27FC236}">
+                <a16:creationId xmlns:a16="http://schemas.microsoft.com/office/drawing/2014/main" id="{5CA4623A-49A9-4A3C-B16B-24D20752747E}"/>
+              </a:ext>
+            </a:extLst>
+          </p:cNvPr>
+          <p:cNvSpPr txBox="1"/>
+          <p:nvPr/>
+        </p:nvSpPr>
+        <p:spPr>
+          <a:xfrm>
+            <a:off x="150922" y="1704512"/>
+            <a:ext cx="3719744" cy="1169551"/>
+          </a:xfrm>
+          <a:prstGeom prst="rect">
+            <a:avLst/>
+          </a:prstGeom>
+          <a:noFill/>
+        </p:spPr>
+        <p:txBody>
+          <a:bodyPr wrap="square" rtlCol="0">
+            <a:spAutoFit/>
+          </a:bodyPr>
+          <a:lstStyle/>
+          <a:p>
+            <a:r>
+              <a:rPr lang="en-GB" sz="1400" dirty="0"/>
+              <a:t>Visual hierarchy using the </a:t>
+            </a:r>
+          </a:p>
+          <a:p>
+            <a:pPr marL="285750" indent="-285750">
+              <a:buFont typeface="Arial" panose="020B0604020202020204" pitchFamily="34" charset="0"/>
+              <a:buChar char="•"/>
+            </a:pPr>
+            <a:r>
+              <a:rPr lang="en-GB" sz="1400" dirty="0"/>
+              <a:t>Financial Year</a:t>
+            </a:r>
+          </a:p>
+          <a:p>
+            <a:pPr marL="285750" indent="-285750">
+              <a:buFont typeface="Arial" panose="020B0604020202020204" pitchFamily="34" charset="0"/>
+              <a:buChar char="•"/>
+            </a:pPr>
+            <a:r>
+              <a:rPr lang="en-GB" sz="1400" dirty="0"/>
+              <a:t>Financial Month</a:t>
+            </a:r>
+          </a:p>
+          <a:p>
+            <a:pPr marL="285750" indent="-285750">
+              <a:buFont typeface="Arial" panose="020B0604020202020204" pitchFamily="34" charset="0"/>
+              <a:buChar char="•"/>
+            </a:pPr>
+            <a:r>
+              <a:rPr lang="en-GB" sz="1400" dirty="0"/>
+              <a:t>Day</a:t>
+            </a:r>
+            <a:r>
+              <a:rPr lang="en-GB" sz="1400" b="1" dirty="0"/>
+              <a:t> </a:t>
+            </a:r>
+          </a:p>
+          <a:p>
+            <a:r>
+              <a:rPr lang="en-GB" sz="1400" dirty="0"/>
+              <a:t>columns of the</a:t>
+            </a:r>
+            <a:r>
+              <a:rPr lang="en-GB" sz="1400" b="1" dirty="0"/>
+              <a:t> </a:t>
+            </a:r>
+            <a:r>
+              <a:rPr lang="en-GB" sz="1400" b="1" dirty="0" err="1"/>
+              <a:t>MyCalendar</a:t>
+            </a:r>
+            <a:r>
+              <a:rPr lang="en-GB" sz="1400" b="1" dirty="0"/>
+              <a:t>[Date]</a:t>
+            </a:r>
+          </a:p>
+        </p:txBody>
+      </p:sp>
+      <p:sp>
+        <p:nvSpPr>
+          <p:cNvPr id="6" name="Rectangle 5">
+            <a:extLst>
+              <a:ext uri="{FF2B5EF4-FFF2-40B4-BE49-F238E27FC236}">
+                <a16:creationId xmlns:a16="http://schemas.microsoft.com/office/drawing/2014/main" id="{AF8304A7-81AE-49CB-B893-5BC51D1E6A3B}"/>
+              </a:ext>
+            </a:extLst>
+          </p:cNvPr>
+          <p:cNvSpPr/>
+          <p:nvPr/>
+        </p:nvSpPr>
+        <p:spPr>
+          <a:xfrm>
+            <a:off x="2583401" y="1091954"/>
+            <a:ext cx="1624614" cy="408373"/>
+          </a:xfrm>
+          <a:prstGeom prst="rect">
+            <a:avLst/>
+          </a:prstGeom>
+          <a:noFill/>
+        </p:spPr>
+        <p:style>
+          <a:lnRef idx="2">
+            <a:schemeClr val="accent1">
+              <a:shade val="50000"/>
+            </a:schemeClr>
+          </a:lnRef>
+          <a:fillRef idx="1">
+            <a:schemeClr val="accent1"/>
+          </a:fillRef>
+          <a:effectRef idx="0">
+            <a:schemeClr val="accent1"/>
+          </a:effectRef>
+          <a:fontRef idx="minor">
+            <a:schemeClr val="lt1"/>
+          </a:fontRef>
+        </p:style>
+        <p:txBody>
+          <a:bodyPr rtlCol="0" anchor="ctr"/>
+          <a:lstStyle/>
+          <a:p>
+            <a:pPr algn="ctr"/>
+            <a:endParaRPr lang="en-GB"/>
+          </a:p>
+        </p:txBody>
+      </p:sp>
+      <p:cxnSp>
+        <p:nvCxnSpPr>
+          <p:cNvPr id="8" name="Connector: Curved 7">
+            <a:extLst>
+              <a:ext uri="{FF2B5EF4-FFF2-40B4-BE49-F238E27FC236}">
+                <a16:creationId xmlns:a16="http://schemas.microsoft.com/office/drawing/2014/main" id="{215183B1-AE20-4175-B2E0-2E5FAC44CF02}"/>
+              </a:ext>
+            </a:extLst>
+          </p:cNvPr>
+          <p:cNvCxnSpPr>
+            <a:endCxn id="6" idx="1"/>
+          </p:cNvCxnSpPr>
+          <p:nvPr/>
+        </p:nvCxnSpPr>
+        <p:spPr>
+          <a:xfrm flipV="1">
+            <a:off x="816746" y="1296141"/>
+            <a:ext cx="1766655" cy="674702"/>
+          </a:xfrm>
+          <a:prstGeom prst="curvedConnector3">
+            <a:avLst/>
+          </a:prstGeom>
+          <a:ln>
+            <a:tailEnd type="triangle"/>
+          </a:ln>
+        </p:spPr>
+        <p:style>
+          <a:lnRef idx="1">
+            <a:schemeClr val="accent1"/>
+          </a:lnRef>
+          <a:fillRef idx="0">
+            <a:schemeClr val="accent1"/>
+          </a:fillRef>
+          <a:effectRef idx="0">
+            <a:schemeClr val="accent1"/>
+          </a:effectRef>
+          <a:fontRef idx="minor">
+            <a:schemeClr val="tx1"/>
+          </a:fontRef>
+        </p:style>
+      </p:cxnSp>
+      <p:sp>
+        <p:nvSpPr>
+          <p:cNvPr id="9" name="TextBox 8">
+            <a:extLst>
+              <a:ext uri="{FF2B5EF4-FFF2-40B4-BE49-F238E27FC236}">
+                <a16:creationId xmlns:a16="http://schemas.microsoft.com/office/drawing/2014/main" id="{35310C81-B62C-4D6F-BF9A-6C3DBF9A9786}"/>
+              </a:ext>
+            </a:extLst>
+          </p:cNvPr>
+          <p:cNvSpPr txBox="1"/>
+          <p:nvPr/>
+        </p:nvSpPr>
+        <p:spPr>
+          <a:xfrm>
+            <a:off x="8018018" y="1633492"/>
+            <a:ext cx="3719744" cy="523220"/>
+          </a:xfrm>
+          <a:prstGeom prst="rect">
+            <a:avLst/>
+          </a:prstGeom>
+          <a:noFill/>
+        </p:spPr>
+        <p:txBody>
+          <a:bodyPr wrap="square" rtlCol="0">
+            <a:spAutoFit/>
+          </a:bodyPr>
+          <a:lstStyle/>
+          <a:p>
+            <a:r>
+              <a:rPr lang="en-GB" sz="1400" dirty="0"/>
+              <a:t>Custom measure </a:t>
+            </a:r>
+            <a:r>
+              <a:rPr lang="en-GB" sz="1400" b="1" dirty="0" err="1"/>
+              <a:t>TotalSalesInLastYearPeriodUsingMyCalendar</a:t>
+            </a:r>
+            <a:r>
+              <a:rPr lang="en-GB" sz="1400" b="1" dirty="0"/>
+              <a:t> </a:t>
+            </a:r>
+          </a:p>
+        </p:txBody>
+      </p:sp>
+      <p:sp>
+        <p:nvSpPr>
+          <p:cNvPr id="11" name="Rectangle 10">
+            <a:extLst>
+              <a:ext uri="{FF2B5EF4-FFF2-40B4-BE49-F238E27FC236}">
+                <a16:creationId xmlns:a16="http://schemas.microsoft.com/office/drawing/2014/main" id="{DCB6A19C-2C80-4051-9114-5F2B0EE934AD}"/>
+              </a:ext>
+            </a:extLst>
+          </p:cNvPr>
+          <p:cNvSpPr/>
+          <p:nvPr/>
+        </p:nvSpPr>
+        <p:spPr>
+          <a:xfrm>
+            <a:off x="5558900" y="489752"/>
+            <a:ext cx="1624614" cy="408373"/>
+          </a:xfrm>
+          <a:prstGeom prst="rect">
+            <a:avLst/>
+          </a:prstGeom>
+          <a:noFill/>
+        </p:spPr>
+        <p:style>
+          <a:lnRef idx="2">
+            <a:schemeClr val="accent1">
+              <a:shade val="50000"/>
+            </a:schemeClr>
+          </a:lnRef>
+          <a:fillRef idx="1">
+            <a:schemeClr val="accent1"/>
+          </a:fillRef>
+          <a:effectRef idx="0">
+            <a:schemeClr val="accent1"/>
+          </a:effectRef>
+          <a:fontRef idx="minor">
+            <a:schemeClr val="lt1"/>
+          </a:fontRef>
+        </p:style>
+        <p:txBody>
+          <a:bodyPr rtlCol="0" anchor="ctr"/>
+          <a:lstStyle/>
+          <a:p>
+            <a:pPr algn="ctr"/>
+            <a:endParaRPr lang="en-GB"/>
+          </a:p>
+        </p:txBody>
+      </p:sp>
+      <p:cxnSp>
+        <p:nvCxnSpPr>
+          <p:cNvPr id="13" name="Connector: Curved 12">
+            <a:extLst>
+              <a:ext uri="{FF2B5EF4-FFF2-40B4-BE49-F238E27FC236}">
+                <a16:creationId xmlns:a16="http://schemas.microsoft.com/office/drawing/2014/main" id="{B7228848-5E7B-4A83-9452-1F1D79DD40EE}"/>
+              </a:ext>
+            </a:extLst>
+          </p:cNvPr>
+          <p:cNvCxnSpPr>
+            <a:cxnSpLocks/>
+            <a:endCxn id="11" idx="3"/>
+          </p:cNvCxnSpPr>
+          <p:nvPr/>
+        </p:nvCxnSpPr>
+        <p:spPr>
+          <a:xfrm rot="10800000">
+            <a:off x="7183515" y="693940"/>
+            <a:ext cx="2262327" cy="1201163"/>
+          </a:xfrm>
+          <a:prstGeom prst="curvedConnector3">
+            <a:avLst/>
+          </a:prstGeom>
+          <a:ln>
+            <a:tailEnd type="triangle"/>
+          </a:ln>
+        </p:spPr>
+        <p:style>
+          <a:lnRef idx="1">
+            <a:schemeClr val="accent1"/>
+          </a:lnRef>
+          <a:fillRef idx="0">
+            <a:schemeClr val="accent1"/>
+          </a:fillRef>
+          <a:effectRef idx="0">
+            <a:schemeClr val="accent1"/>
+          </a:effectRef>
+          <a:fontRef idx="minor">
+            <a:schemeClr val="tx1"/>
+          </a:fontRef>
+        </p:style>
+      </p:cxnSp>
+      <p:sp>
+        <p:nvSpPr>
+          <p:cNvPr id="15" name="Rectangle 14">
+            <a:extLst>
+              <a:ext uri="{FF2B5EF4-FFF2-40B4-BE49-F238E27FC236}">
+                <a16:creationId xmlns:a16="http://schemas.microsoft.com/office/drawing/2014/main" id="{A82EFB6B-43B3-4C96-915E-24E4137A583A}"/>
+              </a:ext>
+            </a:extLst>
+          </p:cNvPr>
+          <p:cNvSpPr/>
+          <p:nvPr/>
+        </p:nvSpPr>
+        <p:spPr>
+          <a:xfrm>
+            <a:off x="5808954" y="5178642"/>
+            <a:ext cx="1624615" cy="147960"/>
+          </a:xfrm>
+          <a:prstGeom prst="rect">
+            <a:avLst/>
+          </a:prstGeom>
+          <a:noFill/>
+          <a:ln w="28575">
+            <a:solidFill>
+              <a:srgbClr val="FFC000"/>
+            </a:solidFill>
+          </a:ln>
+        </p:spPr>
+        <p:style>
+          <a:lnRef idx="2">
+            <a:schemeClr val="accent1">
+              <a:shade val="50000"/>
+            </a:schemeClr>
+          </a:lnRef>
+          <a:fillRef idx="1">
+            <a:schemeClr val="accent1"/>
+          </a:fillRef>
+          <a:effectRef idx="0">
+            <a:schemeClr val="accent1"/>
+          </a:effectRef>
+          <a:fontRef idx="minor">
+            <a:schemeClr val="lt1"/>
+          </a:fontRef>
+        </p:style>
+        <p:txBody>
+          <a:bodyPr rtlCol="0" anchor="ctr"/>
+          <a:lstStyle/>
+          <a:p>
+            <a:pPr algn="ctr"/>
+            <a:endParaRPr lang="en-GB"/>
+          </a:p>
+        </p:txBody>
+      </p:sp>
+      <p:sp>
+        <p:nvSpPr>
+          <p:cNvPr id="16" name="Rectangle 15">
+            <a:extLst>
+              <a:ext uri="{FF2B5EF4-FFF2-40B4-BE49-F238E27FC236}">
+                <a16:creationId xmlns:a16="http://schemas.microsoft.com/office/drawing/2014/main" id="{69AC2108-9312-4C30-A853-6407CEFC73A0}"/>
+              </a:ext>
+            </a:extLst>
+          </p:cNvPr>
+          <p:cNvSpPr/>
+          <p:nvPr/>
+        </p:nvSpPr>
+        <p:spPr>
+          <a:xfrm>
+            <a:off x="3098307" y="2795643"/>
+            <a:ext cx="2639582" cy="178376"/>
+          </a:xfrm>
+          <a:prstGeom prst="rect">
+            <a:avLst/>
+          </a:prstGeom>
+          <a:noFill/>
+          <a:ln w="28575">
+            <a:solidFill>
+              <a:srgbClr val="FFC000"/>
+            </a:solidFill>
+          </a:ln>
+        </p:spPr>
+        <p:style>
+          <a:lnRef idx="2">
+            <a:schemeClr val="accent1">
+              <a:shade val="50000"/>
+            </a:schemeClr>
+          </a:lnRef>
+          <a:fillRef idx="1">
+            <a:schemeClr val="accent1"/>
+          </a:fillRef>
+          <a:effectRef idx="0">
+            <a:schemeClr val="accent1"/>
+          </a:effectRef>
+          <a:fontRef idx="minor">
+            <a:schemeClr val="lt1"/>
+          </a:fontRef>
+        </p:style>
+        <p:txBody>
+          <a:bodyPr rtlCol="0" anchor="ctr"/>
+          <a:lstStyle/>
+          <a:p>
+            <a:pPr algn="ctr"/>
+            <a:endParaRPr lang="en-GB"/>
+          </a:p>
+        </p:txBody>
+      </p:sp>
+      <p:cxnSp>
+        <p:nvCxnSpPr>
+          <p:cNvPr id="18" name="Straight Arrow Connector 17">
+            <a:extLst>
+              <a:ext uri="{FF2B5EF4-FFF2-40B4-BE49-F238E27FC236}">
+                <a16:creationId xmlns:a16="http://schemas.microsoft.com/office/drawing/2014/main" id="{D9F98931-E228-4CF2-B525-38CE603C8BAF}"/>
+              </a:ext>
+            </a:extLst>
+          </p:cNvPr>
+          <p:cNvCxnSpPr/>
+          <p:nvPr/>
+        </p:nvCxnSpPr>
+        <p:spPr>
+          <a:xfrm>
+            <a:off x="4421080" y="2874063"/>
+            <a:ext cx="1544714" cy="2350445"/>
+          </a:xfrm>
+          <a:prstGeom prst="straightConnector1">
+            <a:avLst/>
+          </a:prstGeom>
+          <a:ln>
+            <a:headEnd type="triangle"/>
+            <a:tailEnd type="triangle"/>
+          </a:ln>
+        </p:spPr>
+        <p:style>
+          <a:lnRef idx="1">
+            <a:schemeClr val="accent1"/>
+          </a:lnRef>
+          <a:fillRef idx="0">
+            <a:schemeClr val="accent1"/>
+          </a:fillRef>
+          <a:effectRef idx="0">
+            <a:schemeClr val="accent1"/>
+          </a:effectRef>
+          <a:fontRef idx="minor">
+            <a:schemeClr val="tx1"/>
+          </a:fontRef>
+        </p:style>
+      </p:cxnSp>
+      <p:sp>
+        <p:nvSpPr>
+          <p:cNvPr id="19" name="TextBox 18">
+            <a:extLst>
+              <a:ext uri="{FF2B5EF4-FFF2-40B4-BE49-F238E27FC236}">
+                <a16:creationId xmlns:a16="http://schemas.microsoft.com/office/drawing/2014/main" id="{A34B1725-B083-40A4-A6D8-96334C3AE366}"/>
+              </a:ext>
+            </a:extLst>
+          </p:cNvPr>
+          <p:cNvSpPr txBox="1"/>
+          <p:nvPr/>
+        </p:nvSpPr>
+        <p:spPr>
+          <a:xfrm>
+            <a:off x="7796076" y="5057404"/>
+            <a:ext cx="3719744" cy="738664"/>
+          </a:xfrm>
+          <a:prstGeom prst="rect">
+            <a:avLst/>
+          </a:prstGeom>
+          <a:noFill/>
+        </p:spPr>
+        <p:txBody>
+          <a:bodyPr wrap="square" rtlCol="0">
+            <a:spAutoFit/>
+          </a:bodyPr>
+          <a:lstStyle/>
+          <a:p>
+            <a:r>
+              <a:rPr lang="en-GB" sz="1400" b="1" dirty="0"/>
+              <a:t>How do we know this DAX measure works?</a:t>
+            </a:r>
+          </a:p>
+          <a:p>
+            <a:r>
+              <a:rPr lang="en-GB" sz="1400" dirty="0"/>
+              <a:t>The sales for a period in 2020 matches the previous years sales</a:t>
+            </a:r>
+          </a:p>
+        </p:txBody>
+      </p:sp>
+      <p:sp>
+        <p:nvSpPr>
+          <p:cNvPr id="20" name="TextBox 19">
+            <a:extLst>
+              <a:ext uri="{FF2B5EF4-FFF2-40B4-BE49-F238E27FC236}">
+                <a16:creationId xmlns:a16="http://schemas.microsoft.com/office/drawing/2014/main" id="{B5D4664C-561E-47A5-8BCF-A54361D43948}"/>
+              </a:ext>
+            </a:extLst>
+          </p:cNvPr>
+          <p:cNvSpPr txBox="1"/>
+          <p:nvPr/>
+        </p:nvSpPr>
+        <p:spPr>
+          <a:xfrm>
+            <a:off x="8000309" y="116954"/>
+            <a:ext cx="3719744" cy="523220"/>
+          </a:xfrm>
+          <a:prstGeom prst="rect">
+            <a:avLst/>
+          </a:prstGeom>
+          <a:noFill/>
+        </p:spPr>
+        <p:txBody>
+          <a:bodyPr wrap="square" rtlCol="0">
+            <a:spAutoFit/>
+          </a:bodyPr>
+          <a:lstStyle/>
+          <a:p>
+            <a:r>
+              <a:rPr lang="en-GB" sz="1400" dirty="0"/>
+              <a:t>Custom measure</a:t>
+            </a:r>
+            <a:br>
+              <a:rPr lang="en-GB" sz="1400" dirty="0"/>
+            </a:br>
+            <a:r>
+              <a:rPr lang="en-GB" sz="1400" b="1" dirty="0" err="1"/>
+              <a:t>TotalSalesInPeriodUsingMyCalendar</a:t>
+            </a:r>
+            <a:endParaRPr lang="en-GB" sz="1400" b="1" dirty="0"/>
+          </a:p>
+        </p:txBody>
+      </p:sp>
+      <p:sp>
+        <p:nvSpPr>
+          <p:cNvPr id="21" name="Rectangle 20">
+            <a:extLst>
+              <a:ext uri="{FF2B5EF4-FFF2-40B4-BE49-F238E27FC236}">
+                <a16:creationId xmlns:a16="http://schemas.microsoft.com/office/drawing/2014/main" id="{53301782-A32B-454C-8743-0BB173026C4F}"/>
+              </a:ext>
+            </a:extLst>
+          </p:cNvPr>
+          <p:cNvSpPr/>
+          <p:nvPr/>
+        </p:nvSpPr>
+        <p:spPr>
+          <a:xfrm>
+            <a:off x="3902477" y="489752"/>
+            <a:ext cx="1228816" cy="408373"/>
+          </a:xfrm>
+          <a:prstGeom prst="rect">
+            <a:avLst/>
+          </a:prstGeom>
+          <a:noFill/>
+        </p:spPr>
+        <p:style>
+          <a:lnRef idx="2">
+            <a:schemeClr val="accent1">
+              <a:shade val="50000"/>
+            </a:schemeClr>
+          </a:lnRef>
+          <a:fillRef idx="1">
+            <a:schemeClr val="accent1"/>
+          </a:fillRef>
+          <a:effectRef idx="0">
+            <a:schemeClr val="accent1"/>
+          </a:effectRef>
+          <a:fontRef idx="minor">
+            <a:schemeClr val="lt1"/>
+          </a:fontRef>
+        </p:style>
+        <p:txBody>
+          <a:bodyPr rtlCol="0" anchor="ctr"/>
+          <a:lstStyle/>
+          <a:p>
+            <a:pPr algn="ctr"/>
+            <a:endParaRPr lang="en-GB"/>
+          </a:p>
+        </p:txBody>
+      </p:sp>
+      <p:cxnSp>
+        <p:nvCxnSpPr>
+          <p:cNvPr id="29" name="Connector: Curved 28">
+            <a:extLst>
+              <a:ext uri="{FF2B5EF4-FFF2-40B4-BE49-F238E27FC236}">
+                <a16:creationId xmlns:a16="http://schemas.microsoft.com/office/drawing/2014/main" id="{2B850DF8-B6EA-4066-971D-906BBE03F576}"/>
+              </a:ext>
+            </a:extLst>
+          </p:cNvPr>
+          <p:cNvCxnSpPr>
+            <a:cxnSpLocks/>
+          </p:cNvCxnSpPr>
+          <p:nvPr/>
+        </p:nvCxnSpPr>
+        <p:spPr>
+          <a:xfrm rot="10800000" flipV="1">
+            <a:off x="5131293" y="115674"/>
+            <a:ext cx="2965144" cy="429480"/>
+          </a:xfrm>
+          <a:prstGeom prst="curvedConnector3">
+            <a:avLst>
+              <a:gd name="adj1" fmla="val 50000"/>
+            </a:avLst>
+          </a:prstGeom>
+          <a:ln>
+            <a:tailEnd type="triangle"/>
+          </a:ln>
+        </p:spPr>
+        <p:style>
+          <a:lnRef idx="1">
+            <a:schemeClr val="accent1"/>
+          </a:lnRef>
+          <a:fillRef idx="0">
+            <a:schemeClr val="accent1"/>
+          </a:fillRef>
+          <a:effectRef idx="0">
+            <a:schemeClr val="accent1"/>
+          </a:effectRef>
+          <a:fontRef idx="minor">
+            <a:schemeClr val="tx1"/>
+          </a:fontRef>
+        </p:style>
+      </p:cxnSp>
+    </p:spTree>
+    <p:extLst>
+      <p:ext uri="{BB962C8B-B14F-4D97-AF65-F5344CB8AC3E}">
+        <p14:creationId xmlns:p14="http://schemas.microsoft.com/office/powerpoint/2010/main" val="269660181"/>
+      </p:ext>
+    </p:extLst>
+  </p:cSld>
+  <p:clrMapOvr>
+    <a:masterClrMapping/>
+  </p:clrMapOvr>
+</p:sld>
+</file>
+
+<file path=ppt/slides/slide4.xml><?xml version="1.0" encoding="utf-8"?>
+<p:sld xmlns:a="http://schemas.openxmlformats.org/drawingml/2006/main" xmlns:r="http://schemas.openxmlformats.org/officeDocument/2006/relationships" xmlns:p="http://schemas.openxmlformats.org/presentationml/2006/main">
+  <p:cSld>
+    <p:spTree>
+      <p:nvGrpSpPr>
+        <p:cNvPr id="1" name=""/>
+        <p:cNvGrpSpPr/>
+        <p:nvPr/>
+      </p:nvGrpSpPr>
+      <p:grpSpPr>
+        <a:xfrm>
+          <a:off x="0" y="0"/>
+          <a:ext cx="0" cy="0"/>
+          <a:chOff x="0" y="0"/>
+          <a:chExt cx="0" cy="0"/>
+        </a:xfrm>
+      </p:grpSpPr>
+      <p:pic>
+        <p:nvPicPr>
+          <p:cNvPr id="6" name="Picture 5">
+            <a:extLst>
+              <a:ext uri="{FF2B5EF4-FFF2-40B4-BE49-F238E27FC236}">
+                <a16:creationId xmlns:a16="http://schemas.microsoft.com/office/drawing/2014/main" id="{3EDFDA18-B759-4D4C-87A7-F4AB5D1FB15B}"/>
+              </a:ext>
+            </a:extLst>
+          </p:cNvPr>
+          <p:cNvPicPr>
+            <a:picLocks noChangeAspect="1"/>
+          </p:cNvPicPr>
+          <p:nvPr/>
+        </p:nvPicPr>
+        <p:blipFill>
+          <a:blip r:embed="rId2"/>
+          <a:stretch>
+            <a:fillRect/>
+          </a:stretch>
+        </p:blipFill>
+        <p:spPr>
+          <a:xfrm>
+            <a:off x="200025" y="123825"/>
+            <a:ext cx="11791950" cy="6610350"/>
+          </a:xfrm>
+          <a:prstGeom prst="rect">
+            <a:avLst/>
+          </a:prstGeom>
+        </p:spPr>
+      </p:pic>
+      <p:sp>
+        <p:nvSpPr>
+          <p:cNvPr id="4" name="TextBox 3">
+            <a:extLst>
+              <a:ext uri="{FF2B5EF4-FFF2-40B4-BE49-F238E27FC236}">
+                <a16:creationId xmlns:a16="http://schemas.microsoft.com/office/drawing/2014/main" id="{46AEBF71-0521-4A29-B37C-ED6C4F165DBE}"/>
+              </a:ext>
+            </a:extLst>
+          </p:cNvPr>
+          <p:cNvSpPr txBox="1"/>
+          <p:nvPr/>
+        </p:nvSpPr>
+        <p:spPr>
+          <a:xfrm>
+            <a:off x="284086" y="292963"/>
+            <a:ext cx="4385568" cy="1169551"/>
+          </a:xfrm>
+          <a:prstGeom prst="rect">
+            <a:avLst/>
+          </a:prstGeom>
+          <a:noFill/>
+        </p:spPr>
+        <p:txBody>
+          <a:bodyPr wrap="square" rtlCol="0">
+            <a:spAutoFit/>
+          </a:bodyPr>
+          <a:lstStyle/>
+          <a:p>
+            <a:r>
+              <a:rPr lang="en-GB" sz="1400" b="1" dirty="0"/>
+              <a:t>Clustered column chart</a:t>
+            </a:r>
+          </a:p>
+          <a:p>
+            <a:r>
+              <a:rPr lang="en-GB" sz="1400" b="1" dirty="0"/>
+              <a:t>X-axis</a:t>
+            </a:r>
+            <a:r>
+              <a:rPr lang="en-GB" sz="1400" dirty="0"/>
+              <a:t> =&gt;  Financial Month column of </a:t>
+            </a:r>
+            <a:r>
+              <a:rPr lang="en-GB" sz="1400" b="1" dirty="0" err="1"/>
+              <a:t>MyCalendar</a:t>
+            </a:r>
+            <a:endParaRPr lang="en-GB" sz="1400" b="1" dirty="0"/>
+          </a:p>
+          <a:p>
+            <a:r>
+              <a:rPr lang="en-GB" sz="1400" b="1" dirty="0"/>
+              <a:t>Values</a:t>
+            </a:r>
+            <a:r>
+              <a:rPr lang="en-GB" sz="1400" dirty="0"/>
+              <a:t> =&gt; Custom measures </a:t>
+            </a:r>
+          </a:p>
+          <a:p>
+            <a:pPr marL="285750" indent="-285750">
+              <a:buFont typeface="Arial" panose="020B0604020202020204" pitchFamily="34" charset="0"/>
+              <a:buChar char="•"/>
+            </a:pPr>
+            <a:r>
+              <a:rPr lang="en-GB" sz="1400" dirty="0" err="1"/>
+              <a:t>TotalSalesInPeriodUsingMyCalendar</a:t>
+            </a:r>
+            <a:endParaRPr lang="en-GB" sz="1400" dirty="0"/>
+          </a:p>
+          <a:p>
+            <a:pPr marL="285750" indent="-285750">
+              <a:buFont typeface="Arial" panose="020B0604020202020204" pitchFamily="34" charset="0"/>
+              <a:buChar char="•"/>
+            </a:pPr>
+            <a:r>
+              <a:rPr lang="en-GB" sz="1400" dirty="0" err="1"/>
+              <a:t>TotalSalesInLastYearPeriodUsingMyCalendar</a:t>
+            </a:r>
+            <a:endParaRPr lang="en-GB" sz="1400" dirty="0"/>
+          </a:p>
+        </p:txBody>
+      </p:sp>
+      <p:cxnSp>
+        <p:nvCxnSpPr>
+          <p:cNvPr id="8" name="Straight Arrow Connector 7">
+            <a:extLst>
+              <a:ext uri="{FF2B5EF4-FFF2-40B4-BE49-F238E27FC236}">
+                <a16:creationId xmlns:a16="http://schemas.microsoft.com/office/drawing/2014/main" id="{DE96AA47-3391-449D-BAE8-22B4E7942C7C}"/>
+              </a:ext>
+            </a:extLst>
+          </p:cNvPr>
+          <p:cNvCxnSpPr>
+            <a:cxnSpLocks/>
+          </p:cNvCxnSpPr>
+          <p:nvPr/>
+        </p:nvCxnSpPr>
+        <p:spPr>
+          <a:xfrm>
+            <a:off x="3524435" y="877738"/>
+            <a:ext cx="3203960" cy="888558"/>
+          </a:xfrm>
+          <a:prstGeom prst="straightConnector1">
+            <a:avLst/>
+          </a:prstGeom>
+          <a:ln w="28575">
+            <a:tailEnd type="triangle"/>
+          </a:ln>
+        </p:spPr>
+        <p:style>
+          <a:lnRef idx="1">
+            <a:schemeClr val="accent1"/>
+          </a:lnRef>
+          <a:fillRef idx="0">
+            <a:schemeClr val="accent1"/>
+          </a:fillRef>
+          <a:effectRef idx="0">
+            <a:schemeClr val="accent1"/>
+          </a:effectRef>
+          <a:fontRef idx="minor">
+            <a:schemeClr val="tx1"/>
+          </a:fontRef>
+        </p:style>
+      </p:cxnSp>
+      <p:sp>
+        <p:nvSpPr>
+          <p:cNvPr id="9" name="TextBox 8">
+            <a:extLst>
+              <a:ext uri="{FF2B5EF4-FFF2-40B4-BE49-F238E27FC236}">
+                <a16:creationId xmlns:a16="http://schemas.microsoft.com/office/drawing/2014/main" id="{18709FFC-B908-46FD-A4E3-464BA4076455}"/>
+              </a:ext>
+            </a:extLst>
+          </p:cNvPr>
+          <p:cNvSpPr txBox="1"/>
+          <p:nvPr/>
+        </p:nvSpPr>
+        <p:spPr>
+          <a:xfrm>
+            <a:off x="6361464" y="427607"/>
+            <a:ext cx="2999160" cy="523220"/>
+          </a:xfrm>
+          <a:prstGeom prst="rect">
+            <a:avLst/>
+          </a:prstGeom>
+          <a:noFill/>
+        </p:spPr>
+        <p:txBody>
+          <a:bodyPr wrap="square" rtlCol="0">
+            <a:spAutoFit/>
+          </a:bodyPr>
+          <a:lstStyle/>
+          <a:p>
+            <a:r>
+              <a:rPr lang="en-GB" sz="1400" b="1" dirty="0"/>
+              <a:t>Slicer</a:t>
+            </a:r>
+          </a:p>
+          <a:p>
+            <a:r>
+              <a:rPr lang="en-GB" sz="1400" dirty="0"/>
+              <a:t>Financial Year column of </a:t>
+            </a:r>
+            <a:r>
+              <a:rPr lang="en-GB" sz="1400" b="1" dirty="0" err="1"/>
+              <a:t>MyCalendar</a:t>
+            </a:r>
+            <a:endParaRPr lang="en-GB" sz="1400" b="1" dirty="0"/>
+          </a:p>
+        </p:txBody>
+      </p:sp>
+      <p:cxnSp>
+        <p:nvCxnSpPr>
+          <p:cNvPr id="10" name="Straight Arrow Connector 9">
+            <a:extLst>
+              <a:ext uri="{FF2B5EF4-FFF2-40B4-BE49-F238E27FC236}">
+                <a16:creationId xmlns:a16="http://schemas.microsoft.com/office/drawing/2014/main" id="{5865EFE0-E470-46F3-88E4-87868A4E08B7}"/>
+              </a:ext>
+            </a:extLst>
+          </p:cNvPr>
+          <p:cNvCxnSpPr>
+            <a:cxnSpLocks/>
+          </p:cNvCxnSpPr>
+          <p:nvPr/>
+        </p:nvCxnSpPr>
+        <p:spPr>
+          <a:xfrm flipV="1">
+            <a:off x="7618520" y="292963"/>
+            <a:ext cx="1853954" cy="396254"/>
+          </a:xfrm>
+          <a:prstGeom prst="straightConnector1">
+            <a:avLst/>
+          </a:prstGeom>
+          <a:ln w="28575">
+            <a:tailEnd type="triangle"/>
+          </a:ln>
+        </p:spPr>
+        <p:style>
+          <a:lnRef idx="1">
+            <a:schemeClr val="accent1"/>
+          </a:lnRef>
+          <a:fillRef idx="0">
+            <a:schemeClr val="accent1"/>
+          </a:fillRef>
+          <a:effectRef idx="0">
+            <a:schemeClr val="accent1"/>
+          </a:effectRef>
+          <a:fontRef idx="minor">
+            <a:schemeClr val="tx1"/>
+          </a:fontRef>
+        </p:style>
+      </p:cxnSp>
+      <p:sp>
+        <p:nvSpPr>
+          <p:cNvPr id="12" name="TextBox 11">
+            <a:extLst>
+              <a:ext uri="{FF2B5EF4-FFF2-40B4-BE49-F238E27FC236}">
+                <a16:creationId xmlns:a16="http://schemas.microsoft.com/office/drawing/2014/main" id="{79C3B920-0A1B-4802-B17B-69A55E3659E0}"/>
+              </a:ext>
+            </a:extLst>
+          </p:cNvPr>
+          <p:cNvSpPr txBox="1"/>
+          <p:nvPr/>
+        </p:nvSpPr>
+        <p:spPr>
+          <a:xfrm>
+            <a:off x="7591886" y="1627572"/>
+            <a:ext cx="4286435" cy="307777"/>
+          </a:xfrm>
+          <a:prstGeom prst="rect">
+            <a:avLst/>
+          </a:prstGeom>
+          <a:noFill/>
+        </p:spPr>
+        <p:txBody>
+          <a:bodyPr wrap="square" rtlCol="0">
+            <a:spAutoFit/>
+          </a:bodyPr>
+          <a:lstStyle/>
+          <a:p>
+            <a:r>
+              <a:rPr lang="en-GB" sz="1400" dirty="0"/>
+              <a:t>Measure </a:t>
+            </a:r>
+            <a:r>
+              <a:rPr lang="en-GB" sz="1400" b="1" dirty="0" err="1"/>
+              <a:t>TotalSalesInLastYearPeriodUsingMyCalendar</a:t>
+            </a:r>
+            <a:endParaRPr lang="en-GB" sz="1400" b="1" dirty="0"/>
+          </a:p>
+        </p:txBody>
+      </p:sp>
+      <p:cxnSp>
+        <p:nvCxnSpPr>
+          <p:cNvPr id="13" name="Straight Arrow Connector 12">
+            <a:extLst>
+              <a:ext uri="{FF2B5EF4-FFF2-40B4-BE49-F238E27FC236}">
+                <a16:creationId xmlns:a16="http://schemas.microsoft.com/office/drawing/2014/main" id="{D752D1DC-41AD-42D7-92A5-84C8DCC15FD6}"/>
+              </a:ext>
+            </a:extLst>
+          </p:cNvPr>
+          <p:cNvCxnSpPr>
+            <a:cxnSpLocks/>
+          </p:cNvCxnSpPr>
+          <p:nvPr/>
+        </p:nvCxnSpPr>
+        <p:spPr>
+          <a:xfrm flipH="1">
+            <a:off x="9232777" y="1815466"/>
+            <a:ext cx="1" cy="2436938"/>
+          </a:xfrm>
+          <a:prstGeom prst="straightConnector1">
+            <a:avLst/>
+          </a:prstGeom>
+          <a:ln w="28575">
+            <a:tailEnd type="triangle"/>
+          </a:ln>
+        </p:spPr>
+        <p:style>
+          <a:lnRef idx="1">
+            <a:schemeClr val="accent1"/>
+          </a:lnRef>
+          <a:fillRef idx="0">
+            <a:schemeClr val="accent1"/>
+          </a:fillRef>
+          <a:effectRef idx="0">
+            <a:schemeClr val="accent1"/>
+          </a:effectRef>
+          <a:fontRef idx="minor">
+            <a:schemeClr val="tx1"/>
+          </a:fontRef>
+        </p:style>
+      </p:cxnSp>
+      <p:sp>
+        <p:nvSpPr>
+          <p:cNvPr id="16" name="TextBox 15">
+            <a:extLst>
+              <a:ext uri="{FF2B5EF4-FFF2-40B4-BE49-F238E27FC236}">
+                <a16:creationId xmlns:a16="http://schemas.microsoft.com/office/drawing/2014/main" id="{848E9AF9-75CF-4129-BFEE-2A5A5A8A00AA}"/>
+              </a:ext>
+            </a:extLst>
+          </p:cNvPr>
+          <p:cNvSpPr txBox="1"/>
+          <p:nvPr/>
+        </p:nvSpPr>
+        <p:spPr>
+          <a:xfrm>
+            <a:off x="5382827" y="2039075"/>
+            <a:ext cx="3770052" cy="307777"/>
+          </a:xfrm>
+          <a:prstGeom prst="rect">
+            <a:avLst/>
+          </a:prstGeom>
+          <a:noFill/>
+        </p:spPr>
+        <p:txBody>
+          <a:bodyPr wrap="square" rtlCol="0">
+            <a:spAutoFit/>
+          </a:bodyPr>
+          <a:lstStyle/>
+          <a:p>
+            <a:r>
+              <a:rPr lang="en-GB" sz="1400" dirty="0"/>
+              <a:t>Measure </a:t>
+            </a:r>
+            <a:r>
+              <a:rPr lang="en-GB" sz="1400" b="1" dirty="0" err="1"/>
+              <a:t>TotalSalesInPeriodUsingMyCalendar</a:t>
+            </a:r>
+            <a:endParaRPr lang="en-GB" sz="1400" b="1" dirty="0"/>
+          </a:p>
+        </p:txBody>
+      </p:sp>
+      <p:cxnSp>
+        <p:nvCxnSpPr>
+          <p:cNvPr id="18" name="Straight Arrow Connector 17">
+            <a:extLst>
+              <a:ext uri="{FF2B5EF4-FFF2-40B4-BE49-F238E27FC236}">
+                <a16:creationId xmlns:a16="http://schemas.microsoft.com/office/drawing/2014/main" id="{DBBD2B14-AE7E-4A45-A588-803465360B12}"/>
+              </a:ext>
+            </a:extLst>
+          </p:cNvPr>
+          <p:cNvCxnSpPr>
+            <a:cxnSpLocks/>
+          </p:cNvCxnSpPr>
+          <p:nvPr/>
+        </p:nvCxnSpPr>
+        <p:spPr>
+          <a:xfrm flipH="1">
+            <a:off x="6880198" y="2346852"/>
+            <a:ext cx="1" cy="1364014"/>
+          </a:xfrm>
+          <a:prstGeom prst="straightConnector1">
+            <a:avLst/>
+          </a:prstGeom>
+          <a:ln w="28575">
+            <a:tailEnd type="triangle"/>
+          </a:ln>
+        </p:spPr>
+        <p:style>
+          <a:lnRef idx="1">
+            <a:schemeClr val="accent1"/>
+          </a:lnRef>
+          <a:fillRef idx="0">
+            <a:schemeClr val="accent1"/>
+          </a:fillRef>
+          <a:effectRef idx="0">
+            <a:schemeClr val="accent1"/>
+          </a:effectRef>
+          <a:fontRef idx="minor">
+            <a:schemeClr val="tx1"/>
+          </a:fontRef>
+        </p:style>
+      </p:cxnSp>
+    </p:spTree>
+    <p:extLst>
+      <p:ext uri="{BB962C8B-B14F-4D97-AF65-F5344CB8AC3E}">
+        <p14:creationId xmlns:p14="http://schemas.microsoft.com/office/powerpoint/2010/main" val="1636361763"/>
+      </p:ext>
+    </p:extLst>
+  </p:cSld>
+  <p:clrMapOvr>
+    <a:masterClrMapping/>
+  </p:clrMapOvr>
+</p:sld>
+</file>
+
 <file path=ppt/theme/theme1.xml><?xml version="1.0" encoding="utf-8"?>
 <a:theme xmlns:a="http://schemas.openxmlformats.org/drawingml/2006/main" name="Office Theme">
   <a:themeElements>

</xml_diff>

<commit_message>
Monthly spike in sales (PREVIOUSMONTH)
</commit_message>
<xml_diff>
--- a/dax-cheat-sheet-2/Microsoft PowerPoint Presentation.pptx
+++ b/dax-cheat-sheet-2/Microsoft PowerPoint Presentation.pptx
@@ -9,6 +9,7 @@
     <p:sldId id="257" r:id="rId3"/>
     <p:sldId id="258" r:id="rId4"/>
     <p:sldId id="259" r:id="rId5"/>
+    <p:sldId id="260" r:id="rId6"/>
   </p:sldIdLst>
   <p:sldSz cx="12192000" cy="6858000"/>
   <p:notesSz cx="6858000" cy="9144000"/>
@@ -264,7 +265,7 @@
           <a:p>
             <a:fld id="{E38C79C0-5688-4651-9335-8FE2F7340D3C}" type="datetimeFigureOut">
               <a:rPr lang="en-GB" smtClean="0"/>
-              <a:t>24/07/2021</a:t>
+              <a:t>25/07/2021</a:t>
             </a:fld>
             <a:endParaRPr lang="en-GB"/>
           </a:p>
@@ -464,7 +465,7 @@
           <a:p>
             <a:fld id="{E38C79C0-5688-4651-9335-8FE2F7340D3C}" type="datetimeFigureOut">
               <a:rPr lang="en-GB" smtClean="0"/>
-              <a:t>24/07/2021</a:t>
+              <a:t>25/07/2021</a:t>
             </a:fld>
             <a:endParaRPr lang="en-GB"/>
           </a:p>
@@ -674,7 +675,7 @@
           <a:p>
             <a:fld id="{E38C79C0-5688-4651-9335-8FE2F7340D3C}" type="datetimeFigureOut">
               <a:rPr lang="en-GB" smtClean="0"/>
-              <a:t>24/07/2021</a:t>
+              <a:t>25/07/2021</a:t>
             </a:fld>
             <a:endParaRPr lang="en-GB"/>
           </a:p>
@@ -874,7 +875,7 @@
           <a:p>
             <a:fld id="{E38C79C0-5688-4651-9335-8FE2F7340D3C}" type="datetimeFigureOut">
               <a:rPr lang="en-GB" smtClean="0"/>
-              <a:t>24/07/2021</a:t>
+              <a:t>25/07/2021</a:t>
             </a:fld>
             <a:endParaRPr lang="en-GB"/>
           </a:p>
@@ -1150,7 +1151,7 @@
           <a:p>
             <a:fld id="{E38C79C0-5688-4651-9335-8FE2F7340D3C}" type="datetimeFigureOut">
               <a:rPr lang="en-GB" smtClean="0"/>
-              <a:t>24/07/2021</a:t>
+              <a:t>25/07/2021</a:t>
             </a:fld>
             <a:endParaRPr lang="en-GB"/>
           </a:p>
@@ -1418,7 +1419,7 @@
           <a:p>
             <a:fld id="{E38C79C0-5688-4651-9335-8FE2F7340D3C}" type="datetimeFigureOut">
               <a:rPr lang="en-GB" smtClean="0"/>
-              <a:t>24/07/2021</a:t>
+              <a:t>25/07/2021</a:t>
             </a:fld>
             <a:endParaRPr lang="en-GB"/>
           </a:p>
@@ -1833,7 +1834,7 @@
           <a:p>
             <a:fld id="{E38C79C0-5688-4651-9335-8FE2F7340D3C}" type="datetimeFigureOut">
               <a:rPr lang="en-GB" smtClean="0"/>
-              <a:t>24/07/2021</a:t>
+              <a:t>25/07/2021</a:t>
             </a:fld>
             <a:endParaRPr lang="en-GB"/>
           </a:p>
@@ -1975,7 +1976,7 @@
           <a:p>
             <a:fld id="{E38C79C0-5688-4651-9335-8FE2F7340D3C}" type="datetimeFigureOut">
               <a:rPr lang="en-GB" smtClean="0"/>
-              <a:t>24/07/2021</a:t>
+              <a:t>25/07/2021</a:t>
             </a:fld>
             <a:endParaRPr lang="en-GB"/>
           </a:p>
@@ -2088,7 +2089,7 @@
           <a:p>
             <a:fld id="{E38C79C0-5688-4651-9335-8FE2F7340D3C}" type="datetimeFigureOut">
               <a:rPr lang="en-GB" smtClean="0"/>
-              <a:t>24/07/2021</a:t>
+              <a:t>25/07/2021</a:t>
             </a:fld>
             <a:endParaRPr lang="en-GB"/>
           </a:p>
@@ -2401,7 +2402,7 @@
           <a:p>
             <a:fld id="{E38C79C0-5688-4651-9335-8FE2F7340D3C}" type="datetimeFigureOut">
               <a:rPr lang="en-GB" smtClean="0"/>
-              <a:t>24/07/2021</a:t>
+              <a:t>25/07/2021</a:t>
             </a:fld>
             <a:endParaRPr lang="en-GB"/>
           </a:p>
@@ -2690,7 +2691,7 @@
           <a:p>
             <a:fld id="{E38C79C0-5688-4651-9335-8FE2F7340D3C}" type="datetimeFigureOut">
               <a:rPr lang="en-GB" smtClean="0"/>
-              <a:t>24/07/2021</a:t>
+              <a:t>25/07/2021</a:t>
             </a:fld>
             <a:endParaRPr lang="en-GB"/>
           </a:p>
@@ -2933,7 +2934,7 @@
           <a:p>
             <a:fld id="{E38C79C0-5688-4651-9335-8FE2F7340D3C}" type="datetimeFigureOut">
               <a:rPr lang="en-GB" smtClean="0"/>
-              <a:t>24/07/2021</a:t>
+              <a:t>25/07/2021</a:t>
             </a:fld>
             <a:endParaRPr lang="en-GB"/>
           </a:p>
@@ -4983,6 +4984,335 @@
 </p:sld>
 </file>
 
+<file path=ppt/slides/slide5.xml><?xml version="1.0" encoding="utf-8"?>
+<p:sld xmlns:a="http://schemas.openxmlformats.org/drawingml/2006/main" xmlns:r="http://schemas.openxmlformats.org/officeDocument/2006/relationships" xmlns:p="http://schemas.openxmlformats.org/presentationml/2006/main">
+  <p:cSld>
+    <p:spTree>
+      <p:nvGrpSpPr>
+        <p:cNvPr id="1" name=""/>
+        <p:cNvGrpSpPr/>
+        <p:nvPr/>
+      </p:nvGrpSpPr>
+      <p:grpSpPr>
+        <a:xfrm>
+          <a:off x="0" y="0"/>
+          <a:ext cx="0" cy="0"/>
+          <a:chOff x="0" y="0"/>
+          <a:chExt cx="0" cy="0"/>
+        </a:xfrm>
+      </p:grpSpPr>
+      <p:pic>
+        <p:nvPicPr>
+          <p:cNvPr id="3" name="Picture 2">
+            <a:extLst>
+              <a:ext uri="{FF2B5EF4-FFF2-40B4-BE49-F238E27FC236}">
+                <a16:creationId xmlns:a16="http://schemas.microsoft.com/office/drawing/2014/main" id="{C5B907B3-398F-42BC-BE78-8271F162A0E4}"/>
+              </a:ext>
+            </a:extLst>
+          </p:cNvPr>
+          <p:cNvPicPr>
+            <a:picLocks noChangeAspect="1"/>
+          </p:cNvPicPr>
+          <p:nvPr/>
+        </p:nvPicPr>
+        <p:blipFill>
+          <a:blip r:embed="rId2"/>
+          <a:stretch>
+            <a:fillRect/>
+          </a:stretch>
+        </p:blipFill>
+        <p:spPr>
+          <a:xfrm>
+            <a:off x="114300" y="47625"/>
+            <a:ext cx="11963400" cy="6762750"/>
+          </a:xfrm>
+          <a:prstGeom prst="rect">
+            <a:avLst/>
+          </a:prstGeom>
+        </p:spPr>
+      </p:pic>
+      <p:sp>
+        <p:nvSpPr>
+          <p:cNvPr id="4" name="TextBox 3">
+            <a:extLst>
+              <a:ext uri="{FF2B5EF4-FFF2-40B4-BE49-F238E27FC236}">
+                <a16:creationId xmlns:a16="http://schemas.microsoft.com/office/drawing/2014/main" id="{62623CFB-B36B-4BB9-B8A6-7B8E9B7D6A84}"/>
+              </a:ext>
+            </a:extLst>
+          </p:cNvPr>
+          <p:cNvSpPr txBox="1"/>
+          <p:nvPr/>
+        </p:nvSpPr>
+        <p:spPr>
+          <a:xfrm>
+            <a:off x="6096000" y="411335"/>
+            <a:ext cx="2999160" cy="523220"/>
+          </a:xfrm>
+          <a:prstGeom prst="rect">
+            <a:avLst/>
+          </a:prstGeom>
+          <a:noFill/>
+        </p:spPr>
+        <p:txBody>
+          <a:bodyPr wrap="square" rtlCol="0">
+            <a:spAutoFit/>
+          </a:bodyPr>
+          <a:lstStyle/>
+          <a:p>
+            <a:r>
+              <a:rPr lang="en-GB" sz="1400" b="1" dirty="0"/>
+              <a:t>Slicer</a:t>
+            </a:r>
+          </a:p>
+          <a:p>
+            <a:r>
+              <a:rPr lang="en-GB" sz="1400" dirty="0"/>
+              <a:t>Financial Year column of </a:t>
+            </a:r>
+            <a:r>
+              <a:rPr lang="en-GB" sz="1400" b="1" dirty="0" err="1"/>
+              <a:t>MyCalendar</a:t>
+            </a:r>
+            <a:endParaRPr lang="en-GB" sz="1400" b="1" dirty="0"/>
+          </a:p>
+        </p:txBody>
+      </p:sp>
+      <p:cxnSp>
+        <p:nvCxnSpPr>
+          <p:cNvPr id="5" name="Straight Arrow Connector 4">
+            <a:extLst>
+              <a:ext uri="{FF2B5EF4-FFF2-40B4-BE49-F238E27FC236}">
+                <a16:creationId xmlns:a16="http://schemas.microsoft.com/office/drawing/2014/main" id="{02B5528F-FE4A-4092-A0AC-C9243E94392B}"/>
+              </a:ext>
+            </a:extLst>
+          </p:cNvPr>
+          <p:cNvCxnSpPr>
+            <a:cxnSpLocks/>
+          </p:cNvCxnSpPr>
+          <p:nvPr/>
+        </p:nvCxnSpPr>
+        <p:spPr>
+          <a:xfrm flipV="1">
+            <a:off x="7618520" y="292963"/>
+            <a:ext cx="1853954" cy="396254"/>
+          </a:xfrm>
+          <a:prstGeom prst="straightConnector1">
+            <a:avLst/>
+          </a:prstGeom>
+          <a:ln w="38100">
+            <a:tailEnd type="triangle"/>
+          </a:ln>
+        </p:spPr>
+        <p:style>
+          <a:lnRef idx="1">
+            <a:schemeClr val="accent1"/>
+          </a:lnRef>
+          <a:fillRef idx="0">
+            <a:schemeClr val="accent1"/>
+          </a:fillRef>
+          <a:effectRef idx="0">
+            <a:schemeClr val="accent1"/>
+          </a:effectRef>
+          <a:fontRef idx="minor">
+            <a:schemeClr val="tx1"/>
+          </a:fontRef>
+        </p:style>
+      </p:cxnSp>
+      <p:sp>
+        <p:nvSpPr>
+          <p:cNvPr id="6" name="TextBox 5">
+            <a:extLst>
+              <a:ext uri="{FF2B5EF4-FFF2-40B4-BE49-F238E27FC236}">
+                <a16:creationId xmlns:a16="http://schemas.microsoft.com/office/drawing/2014/main" id="{323823DC-FEB2-4C8D-9389-AC33C4293EFD}"/>
+              </a:ext>
+            </a:extLst>
+          </p:cNvPr>
+          <p:cNvSpPr txBox="1"/>
+          <p:nvPr/>
+        </p:nvSpPr>
+        <p:spPr>
+          <a:xfrm>
+            <a:off x="284086" y="292963"/>
+            <a:ext cx="5193436" cy="738664"/>
+          </a:xfrm>
+          <a:prstGeom prst="rect">
+            <a:avLst/>
+          </a:prstGeom>
+          <a:noFill/>
+        </p:spPr>
+        <p:txBody>
+          <a:bodyPr wrap="square" rtlCol="0">
+            <a:spAutoFit/>
+          </a:bodyPr>
+          <a:lstStyle/>
+          <a:p>
+            <a:r>
+              <a:rPr lang="en-GB" sz="1400" b="1" dirty="0"/>
+              <a:t>Clustered column chart</a:t>
+            </a:r>
+          </a:p>
+          <a:p>
+            <a:r>
+              <a:rPr lang="en-GB" sz="1400" b="1" dirty="0"/>
+              <a:t>X-axis</a:t>
+            </a:r>
+            <a:r>
+              <a:rPr lang="en-GB" sz="1400" dirty="0"/>
+              <a:t> =&gt;  Financial Month column of </a:t>
+            </a:r>
+            <a:r>
+              <a:rPr lang="en-GB" sz="1400" b="1" dirty="0" err="1"/>
+              <a:t>MyCalendar</a:t>
+            </a:r>
+            <a:endParaRPr lang="en-GB" sz="1400" b="1" dirty="0"/>
+          </a:p>
+          <a:p>
+            <a:r>
+              <a:rPr lang="en-GB" sz="1400" b="1" dirty="0"/>
+              <a:t>Values</a:t>
+            </a:r>
+            <a:r>
+              <a:rPr lang="en-GB" sz="1400" dirty="0"/>
+              <a:t> =&gt; Custom measure </a:t>
+            </a:r>
+            <a:r>
+              <a:rPr lang="en-GB" sz="1400" b="1" dirty="0" err="1"/>
+              <a:t>MonthOnMonthChangeInSales</a:t>
+            </a:r>
+            <a:endParaRPr lang="en-GB" sz="1400" b="1" dirty="0"/>
+          </a:p>
+        </p:txBody>
+      </p:sp>
+      <p:cxnSp>
+        <p:nvCxnSpPr>
+          <p:cNvPr id="7" name="Straight Arrow Connector 6">
+            <a:extLst>
+              <a:ext uri="{FF2B5EF4-FFF2-40B4-BE49-F238E27FC236}">
+                <a16:creationId xmlns:a16="http://schemas.microsoft.com/office/drawing/2014/main" id="{1DD25413-8A3E-40A3-B89E-DC0A42CBBBD6}"/>
+              </a:ext>
+            </a:extLst>
+          </p:cNvPr>
+          <p:cNvCxnSpPr>
+            <a:cxnSpLocks/>
+          </p:cNvCxnSpPr>
+          <p:nvPr/>
+        </p:nvCxnSpPr>
+        <p:spPr>
+          <a:xfrm>
+            <a:off x="3524435" y="877738"/>
+            <a:ext cx="3203960" cy="888558"/>
+          </a:xfrm>
+          <a:prstGeom prst="straightConnector1">
+            <a:avLst/>
+          </a:prstGeom>
+          <a:ln w="38100">
+            <a:tailEnd type="triangle"/>
+          </a:ln>
+        </p:spPr>
+        <p:style>
+          <a:lnRef idx="1">
+            <a:schemeClr val="accent1"/>
+          </a:lnRef>
+          <a:fillRef idx="0">
+            <a:schemeClr val="accent1"/>
+          </a:fillRef>
+          <a:effectRef idx="0">
+            <a:schemeClr val="accent1"/>
+          </a:effectRef>
+          <a:fontRef idx="minor">
+            <a:schemeClr val="tx1"/>
+          </a:fontRef>
+        </p:style>
+      </p:cxnSp>
+      <p:cxnSp>
+        <p:nvCxnSpPr>
+          <p:cNvPr id="8" name="Straight Arrow Connector 7">
+            <a:extLst>
+              <a:ext uri="{FF2B5EF4-FFF2-40B4-BE49-F238E27FC236}">
+                <a16:creationId xmlns:a16="http://schemas.microsoft.com/office/drawing/2014/main" id="{023B9B4F-27CE-4A26-A25B-81A3619F9E6D}"/>
+              </a:ext>
+            </a:extLst>
+          </p:cNvPr>
+          <p:cNvCxnSpPr>
+            <a:cxnSpLocks/>
+          </p:cNvCxnSpPr>
+          <p:nvPr/>
+        </p:nvCxnSpPr>
+        <p:spPr>
+          <a:xfrm flipH="1" flipV="1">
+            <a:off x="6728395" y="5091705"/>
+            <a:ext cx="1225997" cy="332551"/>
+          </a:xfrm>
+          <a:prstGeom prst="straightConnector1">
+            <a:avLst/>
+          </a:prstGeom>
+          <a:ln w="38100">
+            <a:tailEnd type="triangle"/>
+          </a:ln>
+        </p:spPr>
+        <p:style>
+          <a:lnRef idx="1">
+            <a:schemeClr val="accent1"/>
+          </a:lnRef>
+          <a:fillRef idx="0">
+            <a:schemeClr val="accent1"/>
+          </a:fillRef>
+          <a:effectRef idx="0">
+            <a:schemeClr val="accent1"/>
+          </a:effectRef>
+          <a:fontRef idx="minor">
+            <a:schemeClr val="tx1"/>
+          </a:fontRef>
+        </p:style>
+      </p:cxnSp>
+      <p:sp>
+        <p:nvSpPr>
+          <p:cNvPr id="10" name="TextBox 9">
+            <a:extLst>
+              <a:ext uri="{FF2B5EF4-FFF2-40B4-BE49-F238E27FC236}">
+                <a16:creationId xmlns:a16="http://schemas.microsoft.com/office/drawing/2014/main" id="{181264D5-0FCB-4813-92CF-124F432B4295}"/>
+              </a:ext>
+            </a:extLst>
+          </p:cNvPr>
+          <p:cNvSpPr txBox="1"/>
+          <p:nvPr/>
+        </p:nvSpPr>
+        <p:spPr>
+          <a:xfrm>
+            <a:off x="8105313" y="5184559"/>
+            <a:ext cx="1926454" cy="923330"/>
+          </a:xfrm>
+          <a:prstGeom prst="rect">
+            <a:avLst/>
+          </a:prstGeom>
+          <a:noFill/>
+        </p:spPr>
+        <p:txBody>
+          <a:bodyPr wrap="square" rtlCol="0">
+            <a:spAutoFit/>
+          </a:bodyPr>
+          <a:lstStyle/>
+          <a:p>
+            <a:r>
+              <a:rPr lang="en-GB" dirty="0"/>
+              <a:t>A drop in monthly sales from Dec to January</a:t>
+            </a:r>
+          </a:p>
+        </p:txBody>
+      </p:sp>
+    </p:spTree>
+    <p:extLst>
+      <p:ext uri="{BB962C8B-B14F-4D97-AF65-F5344CB8AC3E}">
+        <p14:creationId xmlns:p14="http://schemas.microsoft.com/office/powerpoint/2010/main" val="4195716006"/>
+      </p:ext>
+    </p:extLst>
+  </p:cSld>
+  <p:clrMapOvr>
+    <a:masterClrMapping/>
+  </p:clrMapOvr>
+</p:sld>
+</file>
+
 <file path=ppt/theme/theme1.xml><?xml version="1.0" encoding="utf-8"?>
 <a:theme xmlns:a="http://schemas.openxmlformats.org/drawingml/2006/main" name="Office Theme">
   <a:themeElements>

</xml_diff>

<commit_message>
Completed daily spike in sales
</commit_message>
<xml_diff>
--- a/dax-cheat-sheet-2/Microsoft PowerPoint Presentation.pptx
+++ b/dax-cheat-sheet-2/Microsoft PowerPoint Presentation.pptx
@@ -11,6 +11,7 @@
     <p:sldId id="259" r:id="rId5"/>
     <p:sldId id="260" r:id="rId6"/>
     <p:sldId id="261" r:id="rId7"/>
+    <p:sldId id="262" r:id="rId8"/>
   </p:sldIdLst>
   <p:sldSz cx="12192000" cy="6858000"/>
   <p:notesSz cx="6858000" cy="9144000"/>
@@ -266,7 +267,7 @@
           <a:p>
             <a:fld id="{E38C79C0-5688-4651-9335-8FE2F7340D3C}" type="datetimeFigureOut">
               <a:rPr lang="en-GB" smtClean="0"/>
-              <a:t>25/07/2021</a:t>
+              <a:t>26/07/2021</a:t>
             </a:fld>
             <a:endParaRPr lang="en-GB"/>
           </a:p>
@@ -466,7 +467,7 @@
           <a:p>
             <a:fld id="{E38C79C0-5688-4651-9335-8FE2F7340D3C}" type="datetimeFigureOut">
               <a:rPr lang="en-GB" smtClean="0"/>
-              <a:t>25/07/2021</a:t>
+              <a:t>26/07/2021</a:t>
             </a:fld>
             <a:endParaRPr lang="en-GB"/>
           </a:p>
@@ -676,7 +677,7 @@
           <a:p>
             <a:fld id="{E38C79C0-5688-4651-9335-8FE2F7340D3C}" type="datetimeFigureOut">
               <a:rPr lang="en-GB" smtClean="0"/>
-              <a:t>25/07/2021</a:t>
+              <a:t>26/07/2021</a:t>
             </a:fld>
             <a:endParaRPr lang="en-GB"/>
           </a:p>
@@ -876,7 +877,7 @@
           <a:p>
             <a:fld id="{E38C79C0-5688-4651-9335-8FE2F7340D3C}" type="datetimeFigureOut">
               <a:rPr lang="en-GB" smtClean="0"/>
-              <a:t>25/07/2021</a:t>
+              <a:t>26/07/2021</a:t>
             </a:fld>
             <a:endParaRPr lang="en-GB"/>
           </a:p>
@@ -1152,7 +1153,7 @@
           <a:p>
             <a:fld id="{E38C79C0-5688-4651-9335-8FE2F7340D3C}" type="datetimeFigureOut">
               <a:rPr lang="en-GB" smtClean="0"/>
-              <a:t>25/07/2021</a:t>
+              <a:t>26/07/2021</a:t>
             </a:fld>
             <a:endParaRPr lang="en-GB"/>
           </a:p>
@@ -1420,7 +1421,7 @@
           <a:p>
             <a:fld id="{E38C79C0-5688-4651-9335-8FE2F7340D3C}" type="datetimeFigureOut">
               <a:rPr lang="en-GB" smtClean="0"/>
-              <a:t>25/07/2021</a:t>
+              <a:t>26/07/2021</a:t>
             </a:fld>
             <a:endParaRPr lang="en-GB"/>
           </a:p>
@@ -1835,7 +1836,7 @@
           <a:p>
             <a:fld id="{E38C79C0-5688-4651-9335-8FE2F7340D3C}" type="datetimeFigureOut">
               <a:rPr lang="en-GB" smtClean="0"/>
-              <a:t>25/07/2021</a:t>
+              <a:t>26/07/2021</a:t>
             </a:fld>
             <a:endParaRPr lang="en-GB"/>
           </a:p>
@@ -1977,7 +1978,7 @@
           <a:p>
             <a:fld id="{E38C79C0-5688-4651-9335-8FE2F7340D3C}" type="datetimeFigureOut">
               <a:rPr lang="en-GB" smtClean="0"/>
-              <a:t>25/07/2021</a:t>
+              <a:t>26/07/2021</a:t>
             </a:fld>
             <a:endParaRPr lang="en-GB"/>
           </a:p>
@@ -2090,7 +2091,7 @@
           <a:p>
             <a:fld id="{E38C79C0-5688-4651-9335-8FE2F7340D3C}" type="datetimeFigureOut">
               <a:rPr lang="en-GB" smtClean="0"/>
-              <a:t>25/07/2021</a:t>
+              <a:t>26/07/2021</a:t>
             </a:fld>
             <a:endParaRPr lang="en-GB"/>
           </a:p>
@@ -2403,7 +2404,7 @@
           <a:p>
             <a:fld id="{E38C79C0-5688-4651-9335-8FE2F7340D3C}" type="datetimeFigureOut">
               <a:rPr lang="en-GB" smtClean="0"/>
-              <a:t>25/07/2021</a:t>
+              <a:t>26/07/2021</a:t>
             </a:fld>
             <a:endParaRPr lang="en-GB"/>
           </a:p>
@@ -2692,7 +2693,7 @@
           <a:p>
             <a:fld id="{E38C79C0-5688-4651-9335-8FE2F7340D3C}" type="datetimeFigureOut">
               <a:rPr lang="en-GB" smtClean="0"/>
-              <a:t>25/07/2021</a:t>
+              <a:t>26/07/2021</a:t>
             </a:fld>
             <a:endParaRPr lang="en-GB"/>
           </a:p>
@@ -2935,7 +2936,7 @@
           <a:p>
             <a:fld id="{E38C79C0-5688-4651-9335-8FE2F7340D3C}" type="datetimeFigureOut">
               <a:rPr lang="en-GB" smtClean="0"/>
-              <a:t>25/07/2021</a:t>
+              <a:t>26/07/2021</a:t>
             </a:fld>
             <a:endParaRPr lang="en-GB"/>
           </a:p>
@@ -5945,6 +5946,455 @@
 </p:sld>
 </file>
 
+<file path=ppt/slides/slide7.xml><?xml version="1.0" encoding="utf-8"?>
+<p:sld xmlns:a="http://schemas.openxmlformats.org/drawingml/2006/main" xmlns:r="http://schemas.openxmlformats.org/officeDocument/2006/relationships" xmlns:p="http://schemas.openxmlformats.org/presentationml/2006/main">
+  <p:cSld>
+    <p:spTree>
+      <p:nvGrpSpPr>
+        <p:cNvPr id="1" name=""/>
+        <p:cNvGrpSpPr/>
+        <p:nvPr/>
+      </p:nvGrpSpPr>
+      <p:grpSpPr>
+        <a:xfrm>
+          <a:off x="0" y="0"/>
+          <a:ext cx="0" cy="0"/>
+          <a:chOff x="0" y="0"/>
+          <a:chExt cx="0" cy="0"/>
+        </a:xfrm>
+      </p:grpSpPr>
+      <p:pic>
+        <p:nvPicPr>
+          <p:cNvPr id="3" name="Picture 2">
+            <a:extLst>
+              <a:ext uri="{FF2B5EF4-FFF2-40B4-BE49-F238E27FC236}">
+                <a16:creationId xmlns:a16="http://schemas.microsoft.com/office/drawing/2014/main" id="{DA7FF5A9-1A2B-484A-A1A9-7D2797DA1D57}"/>
+              </a:ext>
+            </a:extLst>
+          </p:cNvPr>
+          <p:cNvPicPr>
+            <a:picLocks noChangeAspect="1"/>
+          </p:cNvPicPr>
+          <p:nvPr/>
+        </p:nvPicPr>
+        <p:blipFill>
+          <a:blip r:embed="rId2"/>
+          <a:stretch>
+            <a:fillRect/>
+          </a:stretch>
+        </p:blipFill>
+        <p:spPr>
+          <a:xfrm>
+            <a:off x="1446102" y="861134"/>
+            <a:ext cx="10050572" cy="5996866"/>
+          </a:xfrm>
+          <a:prstGeom prst="rect">
+            <a:avLst/>
+          </a:prstGeom>
+        </p:spPr>
+      </p:pic>
+      <p:cxnSp>
+        <p:nvCxnSpPr>
+          <p:cNvPr id="4" name="Straight Arrow Connector 3">
+            <a:extLst>
+              <a:ext uri="{FF2B5EF4-FFF2-40B4-BE49-F238E27FC236}">
+                <a16:creationId xmlns:a16="http://schemas.microsoft.com/office/drawing/2014/main" id="{401A1B94-2B1B-4374-82BB-6898ECCA08F3}"/>
+              </a:ext>
+            </a:extLst>
+          </p:cNvPr>
+          <p:cNvCxnSpPr>
+            <a:cxnSpLocks/>
+          </p:cNvCxnSpPr>
+          <p:nvPr/>
+        </p:nvCxnSpPr>
+        <p:spPr>
+          <a:xfrm>
+            <a:off x="1083075" y="667740"/>
+            <a:ext cx="284086" cy="1054529"/>
+          </a:xfrm>
+          <a:prstGeom prst="straightConnector1">
+            <a:avLst/>
+          </a:prstGeom>
+          <a:ln w="38100">
+            <a:tailEnd type="triangle"/>
+          </a:ln>
+        </p:spPr>
+        <p:style>
+          <a:lnRef idx="1">
+            <a:schemeClr val="accent1"/>
+          </a:lnRef>
+          <a:fillRef idx="0">
+            <a:schemeClr val="accent1"/>
+          </a:fillRef>
+          <a:effectRef idx="0">
+            <a:schemeClr val="accent1"/>
+          </a:effectRef>
+          <a:fontRef idx="minor">
+            <a:schemeClr val="tx1"/>
+          </a:fontRef>
+        </p:style>
+      </p:cxnSp>
+      <p:sp>
+        <p:nvSpPr>
+          <p:cNvPr id="5" name="TextBox 4">
+            <a:extLst>
+              <a:ext uri="{FF2B5EF4-FFF2-40B4-BE49-F238E27FC236}">
+                <a16:creationId xmlns:a16="http://schemas.microsoft.com/office/drawing/2014/main" id="{22A0B09E-5FA1-4EAB-988A-59886A5071BD}"/>
+              </a:ext>
+            </a:extLst>
+          </p:cNvPr>
+          <p:cNvSpPr txBox="1"/>
+          <p:nvPr/>
+        </p:nvSpPr>
+        <p:spPr>
+          <a:xfrm>
+            <a:off x="381737" y="218508"/>
+            <a:ext cx="3613213" cy="369332"/>
+          </a:xfrm>
+          <a:prstGeom prst="rect">
+            <a:avLst/>
+          </a:prstGeom>
+          <a:noFill/>
+        </p:spPr>
+        <p:txBody>
+          <a:bodyPr wrap="square" rtlCol="0">
+            <a:spAutoFit/>
+          </a:bodyPr>
+          <a:lstStyle/>
+          <a:p>
+            <a:r>
+              <a:rPr lang="en-GB" dirty="0"/>
+              <a:t>Slicer on </a:t>
+            </a:r>
+            <a:r>
+              <a:rPr lang="en-GB" b="1" dirty="0" err="1"/>
+              <a:t>MyCalendar</a:t>
+            </a:r>
+            <a:r>
+              <a:rPr lang="en-GB" b="1" dirty="0"/>
+              <a:t>[</a:t>
+            </a:r>
+            <a:r>
+              <a:rPr lang="en-GB" b="1" dirty="0" err="1"/>
+              <a:t>FinancialYear</a:t>
+            </a:r>
+            <a:r>
+              <a:rPr lang="en-GB" b="1" dirty="0"/>
+              <a:t>]</a:t>
+            </a:r>
+          </a:p>
+        </p:txBody>
+      </p:sp>
+      <p:sp>
+        <p:nvSpPr>
+          <p:cNvPr id="6" name="TextBox 5">
+            <a:extLst>
+              <a:ext uri="{FF2B5EF4-FFF2-40B4-BE49-F238E27FC236}">
+                <a16:creationId xmlns:a16="http://schemas.microsoft.com/office/drawing/2014/main" id="{6A0CE624-C724-4D4E-9D05-E1721ED7C37F}"/>
+              </a:ext>
+            </a:extLst>
+          </p:cNvPr>
+          <p:cNvSpPr txBox="1"/>
+          <p:nvPr/>
+        </p:nvSpPr>
+        <p:spPr>
+          <a:xfrm>
+            <a:off x="4999606" y="212849"/>
+            <a:ext cx="3815920" cy="369332"/>
+          </a:xfrm>
+          <a:prstGeom prst="rect">
+            <a:avLst/>
+          </a:prstGeom>
+          <a:noFill/>
+        </p:spPr>
+        <p:txBody>
+          <a:bodyPr wrap="square" rtlCol="0">
+            <a:spAutoFit/>
+          </a:bodyPr>
+          <a:lstStyle/>
+          <a:p>
+            <a:r>
+              <a:rPr lang="en-GB" dirty="0"/>
+              <a:t>Slicer on </a:t>
+            </a:r>
+            <a:r>
+              <a:rPr lang="en-GB" b="1" dirty="0" err="1"/>
+              <a:t>MyCalendar</a:t>
+            </a:r>
+            <a:r>
+              <a:rPr lang="en-GB" b="1" dirty="0"/>
+              <a:t>[</a:t>
+            </a:r>
+            <a:r>
+              <a:rPr lang="en-GB" b="1" dirty="0" err="1"/>
+              <a:t>FinancialMonth</a:t>
+            </a:r>
+            <a:r>
+              <a:rPr lang="en-GB" b="1" dirty="0"/>
+              <a:t>]</a:t>
+            </a:r>
+          </a:p>
+        </p:txBody>
+      </p:sp>
+      <p:cxnSp>
+        <p:nvCxnSpPr>
+          <p:cNvPr id="7" name="Straight Arrow Connector 6">
+            <a:extLst>
+              <a:ext uri="{FF2B5EF4-FFF2-40B4-BE49-F238E27FC236}">
+                <a16:creationId xmlns:a16="http://schemas.microsoft.com/office/drawing/2014/main" id="{EBE502A3-8CEB-4318-960A-C4C97390316F}"/>
+              </a:ext>
+            </a:extLst>
+          </p:cNvPr>
+          <p:cNvCxnSpPr>
+            <a:cxnSpLocks/>
+          </p:cNvCxnSpPr>
+          <p:nvPr/>
+        </p:nvCxnSpPr>
+        <p:spPr>
+          <a:xfrm>
+            <a:off x="7403977" y="514905"/>
+            <a:ext cx="532660" cy="680099"/>
+          </a:xfrm>
+          <a:prstGeom prst="straightConnector1">
+            <a:avLst/>
+          </a:prstGeom>
+          <a:ln w="38100">
+            <a:tailEnd type="triangle"/>
+          </a:ln>
+        </p:spPr>
+        <p:style>
+          <a:lnRef idx="1">
+            <a:schemeClr val="accent1"/>
+          </a:lnRef>
+          <a:fillRef idx="0">
+            <a:schemeClr val="accent1"/>
+          </a:fillRef>
+          <a:effectRef idx="0">
+            <a:schemeClr val="accent1"/>
+          </a:effectRef>
+          <a:fontRef idx="minor">
+            <a:schemeClr val="tx1"/>
+          </a:fontRef>
+        </p:style>
+      </p:cxnSp>
+      <p:sp>
+        <p:nvSpPr>
+          <p:cNvPr id="10" name="TextBox 9">
+            <a:extLst>
+              <a:ext uri="{FF2B5EF4-FFF2-40B4-BE49-F238E27FC236}">
+                <a16:creationId xmlns:a16="http://schemas.microsoft.com/office/drawing/2014/main" id="{54C6C351-D486-4D11-843F-FD579E5CAC2A}"/>
+              </a:ext>
+            </a:extLst>
+          </p:cNvPr>
+          <p:cNvSpPr txBox="1"/>
+          <p:nvPr/>
+        </p:nvSpPr>
+        <p:spPr>
+          <a:xfrm>
+            <a:off x="6164060" y="2566911"/>
+            <a:ext cx="3815920" cy="369332"/>
+          </a:xfrm>
+          <a:prstGeom prst="rect">
+            <a:avLst/>
+          </a:prstGeom>
+          <a:noFill/>
+        </p:spPr>
+        <p:txBody>
+          <a:bodyPr wrap="square" rtlCol="0">
+            <a:spAutoFit/>
+          </a:bodyPr>
+          <a:lstStyle/>
+          <a:p>
+            <a:r>
+              <a:rPr lang="en-GB" dirty="0"/>
+              <a:t>Clustered column chart visual</a:t>
+            </a:r>
+            <a:endParaRPr lang="en-GB" b="1" dirty="0"/>
+          </a:p>
+        </p:txBody>
+      </p:sp>
+      <p:sp>
+        <p:nvSpPr>
+          <p:cNvPr id="11" name="TextBox 10">
+            <a:extLst>
+              <a:ext uri="{FF2B5EF4-FFF2-40B4-BE49-F238E27FC236}">
+                <a16:creationId xmlns:a16="http://schemas.microsoft.com/office/drawing/2014/main" id="{BF9C8C9E-129B-438A-B22B-55BD70B421C0}"/>
+              </a:ext>
+            </a:extLst>
+          </p:cNvPr>
+          <p:cNvSpPr txBox="1"/>
+          <p:nvPr/>
+        </p:nvSpPr>
+        <p:spPr>
+          <a:xfrm>
+            <a:off x="473473" y="6103250"/>
+            <a:ext cx="3815920" cy="369332"/>
+          </a:xfrm>
+          <a:prstGeom prst="rect">
+            <a:avLst/>
+          </a:prstGeom>
+          <a:noFill/>
+        </p:spPr>
+        <p:txBody>
+          <a:bodyPr wrap="square" rtlCol="0">
+            <a:spAutoFit/>
+          </a:bodyPr>
+          <a:lstStyle/>
+          <a:p>
+            <a:r>
+              <a:rPr lang="en-GB" dirty="0"/>
+              <a:t>Axis = </a:t>
+            </a:r>
+            <a:r>
+              <a:rPr lang="en-GB" b="1" dirty="0" err="1"/>
+              <a:t>MyCalendar</a:t>
+            </a:r>
+            <a:r>
+              <a:rPr lang="en-GB" b="1" dirty="0"/>
+              <a:t>[Date]</a:t>
+            </a:r>
+          </a:p>
+        </p:txBody>
+      </p:sp>
+      <p:cxnSp>
+        <p:nvCxnSpPr>
+          <p:cNvPr id="12" name="Straight Arrow Connector 11">
+            <a:extLst>
+              <a:ext uri="{FF2B5EF4-FFF2-40B4-BE49-F238E27FC236}">
+                <a16:creationId xmlns:a16="http://schemas.microsoft.com/office/drawing/2014/main" id="{0EB5AD95-DC55-45D1-B20D-685264F807F4}"/>
+              </a:ext>
+            </a:extLst>
+          </p:cNvPr>
+          <p:cNvCxnSpPr>
+            <a:cxnSpLocks/>
+          </p:cNvCxnSpPr>
+          <p:nvPr/>
+        </p:nvCxnSpPr>
+        <p:spPr>
+          <a:xfrm>
+            <a:off x="3169326" y="6287916"/>
+            <a:ext cx="2299316" cy="0"/>
+          </a:xfrm>
+          <a:prstGeom prst="straightConnector1">
+            <a:avLst/>
+          </a:prstGeom>
+          <a:ln w="38100">
+            <a:tailEnd type="triangle"/>
+          </a:ln>
+        </p:spPr>
+        <p:style>
+          <a:lnRef idx="1">
+            <a:schemeClr val="accent1"/>
+          </a:lnRef>
+          <a:fillRef idx="0">
+            <a:schemeClr val="accent1"/>
+          </a:fillRef>
+          <a:effectRef idx="0">
+            <a:schemeClr val="accent1"/>
+          </a:effectRef>
+          <a:fontRef idx="minor">
+            <a:schemeClr val="tx1"/>
+          </a:fontRef>
+        </p:style>
+      </p:cxnSp>
+      <p:sp>
+        <p:nvSpPr>
+          <p:cNvPr id="15" name="TextBox 14">
+            <a:extLst>
+              <a:ext uri="{FF2B5EF4-FFF2-40B4-BE49-F238E27FC236}">
+                <a16:creationId xmlns:a16="http://schemas.microsoft.com/office/drawing/2014/main" id="{67E76AEF-5392-4D38-89DC-04C6FA38D470}"/>
+              </a:ext>
+            </a:extLst>
+          </p:cNvPr>
+          <p:cNvSpPr txBox="1"/>
+          <p:nvPr/>
+        </p:nvSpPr>
+        <p:spPr>
+          <a:xfrm>
+            <a:off x="6283387" y="6103250"/>
+            <a:ext cx="4462511" cy="369332"/>
+          </a:xfrm>
+          <a:prstGeom prst="rect">
+            <a:avLst/>
+          </a:prstGeom>
+          <a:noFill/>
+        </p:spPr>
+        <p:txBody>
+          <a:bodyPr wrap="square" rtlCol="0">
+            <a:spAutoFit/>
+          </a:bodyPr>
+          <a:lstStyle/>
+          <a:p>
+            <a:r>
+              <a:rPr lang="en-GB" dirty="0"/>
+              <a:t>Values = Custom measure ‘</a:t>
+            </a:r>
+            <a:r>
+              <a:rPr lang="en-GB" b="1" dirty="0" err="1"/>
+              <a:t>DailySpikeInSales</a:t>
+            </a:r>
+            <a:r>
+              <a:rPr lang="en-GB" dirty="0"/>
+              <a:t>’ </a:t>
+            </a:r>
+            <a:endParaRPr lang="en-GB" b="1" dirty="0"/>
+          </a:p>
+        </p:txBody>
+      </p:sp>
+      <p:cxnSp>
+        <p:nvCxnSpPr>
+          <p:cNvPr id="16" name="Straight Arrow Connector 15">
+            <a:extLst>
+              <a:ext uri="{FF2B5EF4-FFF2-40B4-BE49-F238E27FC236}">
+                <a16:creationId xmlns:a16="http://schemas.microsoft.com/office/drawing/2014/main" id="{6BA766BE-BDAB-4CB6-BC24-2FAA5CA3C4C9}"/>
+              </a:ext>
+            </a:extLst>
+          </p:cNvPr>
+          <p:cNvCxnSpPr>
+            <a:cxnSpLocks/>
+          </p:cNvCxnSpPr>
+          <p:nvPr/>
+        </p:nvCxnSpPr>
+        <p:spPr>
+          <a:xfrm flipV="1">
+            <a:off x="8673483" y="4190261"/>
+            <a:ext cx="0" cy="2032986"/>
+          </a:xfrm>
+          <a:prstGeom prst="straightConnector1">
+            <a:avLst/>
+          </a:prstGeom>
+          <a:ln w="38100">
+            <a:tailEnd type="triangle"/>
+          </a:ln>
+        </p:spPr>
+        <p:style>
+          <a:lnRef idx="1">
+            <a:schemeClr val="accent1"/>
+          </a:lnRef>
+          <a:fillRef idx="0">
+            <a:schemeClr val="accent1"/>
+          </a:fillRef>
+          <a:effectRef idx="0">
+            <a:schemeClr val="accent1"/>
+          </a:effectRef>
+          <a:fontRef idx="minor">
+            <a:schemeClr val="tx1"/>
+          </a:fontRef>
+        </p:style>
+      </p:cxnSp>
+    </p:spTree>
+    <p:extLst>
+      <p:ext uri="{BB962C8B-B14F-4D97-AF65-F5344CB8AC3E}">
+        <p14:creationId xmlns:p14="http://schemas.microsoft.com/office/powerpoint/2010/main" val="2517206705"/>
+      </p:ext>
+    </p:extLst>
+  </p:cSld>
+  <p:clrMapOvr>
+    <a:masterClrMapping/>
+  </p:clrMapOvr>
+</p:sld>
+</file>
+
 <file path=ppt/theme/theme1.xml><?xml version="1.0" encoding="utf-8"?>
 <a:theme xmlns:a="http://schemas.openxmlformats.org/drawingml/2006/main" name="Office Theme">
   <a:themeElements>

</xml_diff>

<commit_message>
Completed percentage annual sales
</commit_message>
<xml_diff>
--- a/dax-cheat-sheet-2/Microsoft PowerPoint Presentation.pptx
+++ b/dax-cheat-sheet-2/Microsoft PowerPoint Presentation.pptx
@@ -16,6 +16,8 @@
     <p:sldId id="264" r:id="rId10"/>
     <p:sldId id="265" r:id="rId11"/>
     <p:sldId id="266" r:id="rId12"/>
+    <p:sldId id="267" r:id="rId13"/>
+    <p:sldId id="268" r:id="rId14"/>
   </p:sldIdLst>
   <p:sldSz cx="12192000" cy="6858000"/>
   <p:notesSz cx="6858000" cy="9144000"/>
@@ -116,7 +118,18 @@
   </p:defaultTextStyle>
   <p:extLst>
     <p:ext uri="{EFAFB233-063F-42B5-8137-9DF3F51BA10A}">
-      <p15:sldGuideLst xmlns:p15="http://schemas.microsoft.com/office/powerpoint/2012/main"/>
+      <p15:sldGuideLst xmlns:p15="http://schemas.microsoft.com/office/powerpoint/2012/main">
+        <p15:guide id="1" orient="horz" pos="2160" userDrawn="1">
+          <p15:clr>
+            <a:srgbClr val="A4A3A4"/>
+          </p15:clr>
+        </p15:guide>
+        <p15:guide id="2" pos="3840" userDrawn="1">
+          <p15:clr>
+            <a:srgbClr val="A4A3A4"/>
+          </p15:clr>
+        </p15:guide>
+      </p15:sldGuideLst>
     </p:ext>
   </p:extLst>
 </p:presentation>
@@ -271,7 +284,7 @@
           <a:p>
             <a:fld id="{E38C79C0-5688-4651-9335-8FE2F7340D3C}" type="datetimeFigureOut">
               <a:rPr lang="en-GB" smtClean="0"/>
-              <a:t>30/07/2021</a:t>
+              <a:t>01/08/2021</a:t>
             </a:fld>
             <a:endParaRPr lang="en-GB"/>
           </a:p>
@@ -471,7 +484,7 @@
           <a:p>
             <a:fld id="{E38C79C0-5688-4651-9335-8FE2F7340D3C}" type="datetimeFigureOut">
               <a:rPr lang="en-GB" smtClean="0"/>
-              <a:t>30/07/2021</a:t>
+              <a:t>01/08/2021</a:t>
             </a:fld>
             <a:endParaRPr lang="en-GB"/>
           </a:p>
@@ -681,7 +694,7 @@
           <a:p>
             <a:fld id="{E38C79C0-5688-4651-9335-8FE2F7340D3C}" type="datetimeFigureOut">
               <a:rPr lang="en-GB" smtClean="0"/>
-              <a:t>30/07/2021</a:t>
+              <a:t>01/08/2021</a:t>
             </a:fld>
             <a:endParaRPr lang="en-GB"/>
           </a:p>
@@ -881,7 +894,7 @@
           <a:p>
             <a:fld id="{E38C79C0-5688-4651-9335-8FE2F7340D3C}" type="datetimeFigureOut">
               <a:rPr lang="en-GB" smtClean="0"/>
-              <a:t>30/07/2021</a:t>
+              <a:t>01/08/2021</a:t>
             </a:fld>
             <a:endParaRPr lang="en-GB"/>
           </a:p>
@@ -1157,7 +1170,7 @@
           <a:p>
             <a:fld id="{E38C79C0-5688-4651-9335-8FE2F7340D3C}" type="datetimeFigureOut">
               <a:rPr lang="en-GB" smtClean="0"/>
-              <a:t>30/07/2021</a:t>
+              <a:t>01/08/2021</a:t>
             </a:fld>
             <a:endParaRPr lang="en-GB"/>
           </a:p>
@@ -1425,7 +1438,7 @@
           <a:p>
             <a:fld id="{E38C79C0-5688-4651-9335-8FE2F7340D3C}" type="datetimeFigureOut">
               <a:rPr lang="en-GB" smtClean="0"/>
-              <a:t>30/07/2021</a:t>
+              <a:t>01/08/2021</a:t>
             </a:fld>
             <a:endParaRPr lang="en-GB"/>
           </a:p>
@@ -1840,7 +1853,7 @@
           <a:p>
             <a:fld id="{E38C79C0-5688-4651-9335-8FE2F7340D3C}" type="datetimeFigureOut">
               <a:rPr lang="en-GB" smtClean="0"/>
-              <a:t>30/07/2021</a:t>
+              <a:t>01/08/2021</a:t>
             </a:fld>
             <a:endParaRPr lang="en-GB"/>
           </a:p>
@@ -1982,7 +1995,7 @@
           <a:p>
             <a:fld id="{E38C79C0-5688-4651-9335-8FE2F7340D3C}" type="datetimeFigureOut">
               <a:rPr lang="en-GB" smtClean="0"/>
-              <a:t>30/07/2021</a:t>
+              <a:t>01/08/2021</a:t>
             </a:fld>
             <a:endParaRPr lang="en-GB"/>
           </a:p>
@@ -2095,7 +2108,7 @@
           <a:p>
             <a:fld id="{E38C79C0-5688-4651-9335-8FE2F7340D3C}" type="datetimeFigureOut">
               <a:rPr lang="en-GB" smtClean="0"/>
-              <a:t>30/07/2021</a:t>
+              <a:t>01/08/2021</a:t>
             </a:fld>
             <a:endParaRPr lang="en-GB"/>
           </a:p>
@@ -2408,7 +2421,7 @@
           <a:p>
             <a:fld id="{E38C79C0-5688-4651-9335-8FE2F7340D3C}" type="datetimeFigureOut">
               <a:rPr lang="en-GB" smtClean="0"/>
-              <a:t>30/07/2021</a:t>
+              <a:t>01/08/2021</a:t>
             </a:fld>
             <a:endParaRPr lang="en-GB"/>
           </a:p>
@@ -2697,7 +2710,7 @@
           <a:p>
             <a:fld id="{E38C79C0-5688-4651-9335-8FE2F7340D3C}" type="datetimeFigureOut">
               <a:rPr lang="en-GB" smtClean="0"/>
-              <a:t>30/07/2021</a:t>
+              <a:t>01/08/2021</a:t>
             </a:fld>
             <a:endParaRPr lang="en-GB"/>
           </a:p>
@@ -2940,7 +2953,7 @@
           <a:p>
             <a:fld id="{E38C79C0-5688-4651-9335-8FE2F7340D3C}" type="datetimeFigureOut">
               <a:rPr lang="en-GB" smtClean="0"/>
-              <a:t>30/07/2021</a:t>
+              <a:t>01/08/2021</a:t>
             </a:fld>
             <a:endParaRPr lang="en-GB"/>
           </a:p>
@@ -4203,6 +4216,1376 @@
 </p:sld>
 </file>
 
+<file path=ppt/slides/slide12.xml><?xml version="1.0" encoding="utf-8"?>
+<p:sld xmlns:a="http://schemas.openxmlformats.org/drawingml/2006/main" xmlns:r="http://schemas.openxmlformats.org/officeDocument/2006/relationships" xmlns:p="http://schemas.openxmlformats.org/presentationml/2006/main">
+  <p:cSld>
+    <p:spTree>
+      <p:nvGrpSpPr>
+        <p:cNvPr id="1" name=""/>
+        <p:cNvGrpSpPr/>
+        <p:nvPr/>
+      </p:nvGrpSpPr>
+      <p:grpSpPr>
+        <a:xfrm>
+          <a:off x="0" y="0"/>
+          <a:ext cx="0" cy="0"/>
+          <a:chOff x="0" y="0"/>
+          <a:chExt cx="0" cy="0"/>
+        </a:xfrm>
+      </p:grpSpPr>
+      <p:pic>
+        <p:nvPicPr>
+          <p:cNvPr id="5" name="Picture 4">
+            <a:extLst>
+              <a:ext uri="{FF2B5EF4-FFF2-40B4-BE49-F238E27FC236}">
+                <a16:creationId xmlns:a16="http://schemas.microsoft.com/office/drawing/2014/main" id="{7CCA3385-D2A3-4538-A10E-5808A4D6E33E}"/>
+              </a:ext>
+            </a:extLst>
+          </p:cNvPr>
+          <p:cNvPicPr>
+            <a:picLocks noChangeAspect="1"/>
+          </p:cNvPicPr>
+          <p:nvPr/>
+        </p:nvPicPr>
+        <p:blipFill>
+          <a:blip r:embed="rId2"/>
+          <a:stretch>
+            <a:fillRect/>
+          </a:stretch>
+        </p:blipFill>
+        <p:spPr>
+          <a:xfrm>
+            <a:off x="510003" y="2164949"/>
+            <a:ext cx="11029950" cy="2190750"/>
+          </a:xfrm>
+          <a:prstGeom prst="rect">
+            <a:avLst/>
+          </a:prstGeom>
+        </p:spPr>
+      </p:pic>
+      <p:sp>
+        <p:nvSpPr>
+          <p:cNvPr id="9" name="TextBox 8">
+            <a:extLst>
+              <a:ext uri="{FF2B5EF4-FFF2-40B4-BE49-F238E27FC236}">
+                <a16:creationId xmlns:a16="http://schemas.microsoft.com/office/drawing/2014/main" id="{DF68587A-9662-42D3-8A38-A5521AE6AA13}"/>
+              </a:ext>
+            </a:extLst>
+          </p:cNvPr>
+          <p:cNvSpPr txBox="1"/>
+          <p:nvPr/>
+        </p:nvSpPr>
+        <p:spPr>
+          <a:xfrm>
+            <a:off x="509587" y="406950"/>
+            <a:ext cx="4320927" cy="369332"/>
+          </a:xfrm>
+          <a:prstGeom prst="rect">
+            <a:avLst/>
+          </a:prstGeom>
+          <a:noFill/>
+          <a:ln>
+            <a:solidFill>
+              <a:srgbClr val="FFC000"/>
+            </a:solidFill>
+          </a:ln>
+        </p:spPr>
+        <p:txBody>
+          <a:bodyPr wrap="square" rtlCol="0">
+            <a:spAutoFit/>
+          </a:bodyPr>
+          <a:lstStyle/>
+          <a:p>
+            <a:r>
+              <a:rPr lang="en-GB" dirty="0"/>
+              <a:t>Group by </a:t>
+            </a:r>
+            <a:r>
+              <a:rPr lang="en-GB" b="1" dirty="0"/>
+              <a:t>Year</a:t>
+            </a:r>
+            <a:r>
+              <a:rPr lang="en-GB" dirty="0"/>
+              <a:t> and </a:t>
+            </a:r>
+            <a:r>
+              <a:rPr lang="en-GB" b="1" dirty="0" err="1"/>
+              <a:t>WeekNumber</a:t>
+            </a:r>
+            <a:endParaRPr lang="en-GB" b="1" dirty="0"/>
+          </a:p>
+        </p:txBody>
+      </p:sp>
+      <p:cxnSp>
+        <p:nvCxnSpPr>
+          <p:cNvPr id="10" name="Straight Arrow Connector 9">
+            <a:extLst>
+              <a:ext uri="{FF2B5EF4-FFF2-40B4-BE49-F238E27FC236}">
+                <a16:creationId xmlns:a16="http://schemas.microsoft.com/office/drawing/2014/main" id="{0C05F3DC-F06D-4207-BABA-7E9804D01FF2}"/>
+              </a:ext>
+            </a:extLst>
+          </p:cNvPr>
+          <p:cNvCxnSpPr>
+            <a:cxnSpLocks/>
+          </p:cNvCxnSpPr>
+          <p:nvPr/>
+        </p:nvCxnSpPr>
+        <p:spPr>
+          <a:xfrm>
+            <a:off x="1257970" y="776282"/>
+            <a:ext cx="0" cy="1505279"/>
+          </a:xfrm>
+          <a:prstGeom prst="straightConnector1">
+            <a:avLst/>
+          </a:prstGeom>
+          <a:ln w="38100">
+            <a:solidFill>
+              <a:srgbClr val="FFC000"/>
+            </a:solidFill>
+            <a:tailEnd type="triangle"/>
+          </a:ln>
+        </p:spPr>
+        <p:style>
+          <a:lnRef idx="1">
+            <a:schemeClr val="accent1"/>
+          </a:lnRef>
+          <a:fillRef idx="0">
+            <a:schemeClr val="accent1"/>
+          </a:fillRef>
+          <a:effectRef idx="0">
+            <a:schemeClr val="accent1"/>
+          </a:effectRef>
+          <a:fontRef idx="minor">
+            <a:schemeClr val="tx1"/>
+          </a:fontRef>
+        </p:style>
+      </p:cxnSp>
+      <p:sp>
+        <p:nvSpPr>
+          <p:cNvPr id="8" name="Rectangle 7">
+            <a:extLst>
+              <a:ext uri="{FF2B5EF4-FFF2-40B4-BE49-F238E27FC236}">
+                <a16:creationId xmlns:a16="http://schemas.microsoft.com/office/drawing/2014/main" id="{A2C7214A-8633-47E2-BB77-E803DC97792D}"/>
+              </a:ext>
+            </a:extLst>
+          </p:cNvPr>
+          <p:cNvSpPr/>
+          <p:nvPr/>
+        </p:nvSpPr>
+        <p:spPr>
+          <a:xfrm>
+            <a:off x="509587" y="2185987"/>
+            <a:ext cx="1452378" cy="299761"/>
+          </a:xfrm>
+          <a:prstGeom prst="rect">
+            <a:avLst/>
+          </a:prstGeom>
+          <a:noFill/>
+          <a:ln w="28575">
+            <a:solidFill>
+              <a:srgbClr val="FFC000"/>
+            </a:solidFill>
+          </a:ln>
+        </p:spPr>
+        <p:style>
+          <a:lnRef idx="2">
+            <a:schemeClr val="accent1">
+              <a:shade val="50000"/>
+            </a:schemeClr>
+          </a:lnRef>
+          <a:fillRef idx="1">
+            <a:schemeClr val="accent1"/>
+          </a:fillRef>
+          <a:effectRef idx="0">
+            <a:schemeClr val="accent1"/>
+          </a:effectRef>
+          <a:fontRef idx="minor">
+            <a:schemeClr val="lt1"/>
+          </a:fontRef>
+        </p:style>
+        <p:txBody>
+          <a:bodyPr rtlCol="0" anchor="ctr"/>
+          <a:lstStyle/>
+          <a:p>
+            <a:pPr algn="ctr"/>
+            <a:endParaRPr lang="en-GB"/>
+          </a:p>
+        </p:txBody>
+      </p:sp>
+      <p:sp>
+        <p:nvSpPr>
+          <p:cNvPr id="16" name="Rectangle 15">
+            <a:extLst>
+              <a:ext uri="{FF2B5EF4-FFF2-40B4-BE49-F238E27FC236}">
+                <a16:creationId xmlns:a16="http://schemas.microsoft.com/office/drawing/2014/main" id="{34BF23F9-B6A3-4872-9B1F-8CD4C460C7B3}"/>
+              </a:ext>
+            </a:extLst>
+          </p:cNvPr>
+          <p:cNvSpPr/>
+          <p:nvPr/>
+        </p:nvSpPr>
+        <p:spPr>
+          <a:xfrm>
+            <a:off x="6078243" y="2185987"/>
+            <a:ext cx="1982677" cy="299761"/>
+          </a:xfrm>
+          <a:prstGeom prst="rect">
+            <a:avLst/>
+          </a:prstGeom>
+          <a:noFill/>
+          <a:ln w="28575">
+            <a:solidFill>
+              <a:srgbClr val="FFC000"/>
+            </a:solidFill>
+          </a:ln>
+        </p:spPr>
+        <p:style>
+          <a:lnRef idx="2">
+            <a:schemeClr val="accent1">
+              <a:shade val="50000"/>
+            </a:schemeClr>
+          </a:lnRef>
+          <a:fillRef idx="1">
+            <a:schemeClr val="accent1"/>
+          </a:fillRef>
+          <a:effectRef idx="0">
+            <a:schemeClr val="accent1"/>
+          </a:effectRef>
+          <a:fontRef idx="minor">
+            <a:schemeClr val="lt1"/>
+          </a:fontRef>
+        </p:style>
+        <p:txBody>
+          <a:bodyPr rtlCol="0" anchor="ctr"/>
+          <a:lstStyle/>
+          <a:p>
+            <a:pPr algn="ctr"/>
+            <a:endParaRPr lang="en-GB"/>
+          </a:p>
+        </p:txBody>
+      </p:sp>
+      <p:sp>
+        <p:nvSpPr>
+          <p:cNvPr id="17" name="Rectangle 16">
+            <a:extLst>
+              <a:ext uri="{FF2B5EF4-FFF2-40B4-BE49-F238E27FC236}">
+                <a16:creationId xmlns:a16="http://schemas.microsoft.com/office/drawing/2014/main" id="{B1E1FA75-AA46-49D0-B28A-1D60387C41E5}"/>
+              </a:ext>
+            </a:extLst>
+          </p:cNvPr>
+          <p:cNvSpPr/>
+          <p:nvPr/>
+        </p:nvSpPr>
+        <p:spPr>
+          <a:xfrm>
+            <a:off x="8423426" y="2185987"/>
+            <a:ext cx="2673659" cy="299761"/>
+          </a:xfrm>
+          <a:prstGeom prst="rect">
+            <a:avLst/>
+          </a:prstGeom>
+          <a:noFill/>
+          <a:ln w="28575">
+            <a:solidFill>
+              <a:srgbClr val="00B0F0"/>
+            </a:solidFill>
+          </a:ln>
+        </p:spPr>
+        <p:style>
+          <a:lnRef idx="2">
+            <a:schemeClr val="accent1">
+              <a:shade val="50000"/>
+            </a:schemeClr>
+          </a:lnRef>
+          <a:fillRef idx="1">
+            <a:schemeClr val="accent1"/>
+          </a:fillRef>
+          <a:effectRef idx="0">
+            <a:schemeClr val="accent1"/>
+          </a:effectRef>
+          <a:fontRef idx="minor">
+            <a:schemeClr val="lt1"/>
+          </a:fontRef>
+        </p:style>
+        <p:txBody>
+          <a:bodyPr rtlCol="0" anchor="ctr"/>
+          <a:lstStyle/>
+          <a:p>
+            <a:pPr algn="ctr"/>
+            <a:endParaRPr lang="en-GB"/>
+          </a:p>
+        </p:txBody>
+      </p:sp>
+      <p:sp>
+        <p:nvSpPr>
+          <p:cNvPr id="18" name="TextBox 17">
+            <a:extLst>
+              <a:ext uri="{FF2B5EF4-FFF2-40B4-BE49-F238E27FC236}">
+                <a16:creationId xmlns:a16="http://schemas.microsoft.com/office/drawing/2014/main" id="{A4B2881B-B00C-4CF2-86FB-2479243B02A4}"/>
+              </a:ext>
+            </a:extLst>
+          </p:cNvPr>
+          <p:cNvSpPr txBox="1"/>
+          <p:nvPr/>
+        </p:nvSpPr>
+        <p:spPr>
+          <a:xfrm>
+            <a:off x="5927093" y="376844"/>
+            <a:ext cx="5006937" cy="369332"/>
+          </a:xfrm>
+          <a:prstGeom prst="rect">
+            <a:avLst/>
+          </a:prstGeom>
+          <a:noFill/>
+          <a:ln>
+            <a:solidFill>
+              <a:srgbClr val="FFC000"/>
+            </a:solidFill>
+          </a:ln>
+        </p:spPr>
+        <p:txBody>
+          <a:bodyPr wrap="square" rtlCol="0">
+            <a:spAutoFit/>
+          </a:bodyPr>
+          <a:lstStyle/>
+          <a:p>
+            <a:r>
+              <a:rPr lang="en-GB" b="1" dirty="0"/>
+              <a:t>FIRSTDATE </a:t>
+            </a:r>
+            <a:r>
+              <a:rPr lang="en-GB" dirty="0"/>
+              <a:t>and </a:t>
+            </a:r>
+            <a:r>
+              <a:rPr lang="en-GB" b="1" dirty="0"/>
+              <a:t>LASTDATE</a:t>
+            </a:r>
+            <a:r>
+              <a:rPr lang="en-GB" dirty="0"/>
+              <a:t> on </a:t>
+            </a:r>
+            <a:r>
+              <a:rPr lang="en-GB" b="1" dirty="0"/>
+              <a:t>DATEADD</a:t>
+            </a:r>
+            <a:r>
+              <a:rPr lang="en-GB" dirty="0"/>
+              <a:t>(+1 month)</a:t>
+            </a:r>
+            <a:endParaRPr lang="en-GB" b="1" dirty="0"/>
+          </a:p>
+        </p:txBody>
+      </p:sp>
+      <p:cxnSp>
+        <p:nvCxnSpPr>
+          <p:cNvPr id="19" name="Straight Arrow Connector 18">
+            <a:extLst>
+              <a:ext uri="{FF2B5EF4-FFF2-40B4-BE49-F238E27FC236}">
+                <a16:creationId xmlns:a16="http://schemas.microsoft.com/office/drawing/2014/main" id="{1804D17D-AA4F-4E7D-8917-AC7A3DFDBB77}"/>
+              </a:ext>
+            </a:extLst>
+          </p:cNvPr>
+          <p:cNvCxnSpPr>
+            <a:cxnSpLocks/>
+          </p:cNvCxnSpPr>
+          <p:nvPr/>
+        </p:nvCxnSpPr>
+        <p:spPr>
+          <a:xfrm>
+            <a:off x="6444657" y="746176"/>
+            <a:ext cx="0" cy="1505279"/>
+          </a:xfrm>
+          <a:prstGeom prst="straightConnector1">
+            <a:avLst/>
+          </a:prstGeom>
+          <a:ln w="38100">
+            <a:solidFill>
+              <a:srgbClr val="FFC000"/>
+            </a:solidFill>
+            <a:tailEnd type="triangle"/>
+          </a:ln>
+        </p:spPr>
+        <p:style>
+          <a:lnRef idx="1">
+            <a:schemeClr val="accent1"/>
+          </a:lnRef>
+          <a:fillRef idx="0">
+            <a:schemeClr val="accent1"/>
+          </a:fillRef>
+          <a:effectRef idx="0">
+            <a:schemeClr val="accent1"/>
+          </a:effectRef>
+          <a:fontRef idx="minor">
+            <a:schemeClr val="tx1"/>
+          </a:fontRef>
+        </p:style>
+      </p:cxnSp>
+      <p:sp>
+        <p:nvSpPr>
+          <p:cNvPr id="20" name="TextBox 19">
+            <a:extLst>
+              <a:ext uri="{FF2B5EF4-FFF2-40B4-BE49-F238E27FC236}">
+                <a16:creationId xmlns:a16="http://schemas.microsoft.com/office/drawing/2014/main" id="{6B561431-9501-49EE-B874-9706C83A0D32}"/>
+              </a:ext>
+            </a:extLst>
+          </p:cNvPr>
+          <p:cNvSpPr txBox="1"/>
+          <p:nvPr/>
+        </p:nvSpPr>
+        <p:spPr>
+          <a:xfrm>
+            <a:off x="6710988" y="932405"/>
+            <a:ext cx="6158605" cy="369332"/>
+          </a:xfrm>
+          <a:prstGeom prst="rect">
+            <a:avLst/>
+          </a:prstGeom>
+          <a:noFill/>
+          <a:ln>
+            <a:solidFill>
+              <a:srgbClr val="00B0F0"/>
+            </a:solidFill>
+          </a:ln>
+        </p:spPr>
+        <p:txBody>
+          <a:bodyPr wrap="square" rtlCol="0">
+            <a:spAutoFit/>
+          </a:bodyPr>
+          <a:lstStyle/>
+          <a:p>
+            <a:r>
+              <a:rPr lang="en-GB" b="1" dirty="0"/>
+              <a:t>FIRSTDATE </a:t>
+            </a:r>
+            <a:r>
+              <a:rPr lang="en-GB" dirty="0"/>
+              <a:t>and </a:t>
+            </a:r>
+            <a:r>
+              <a:rPr lang="en-GB" b="1" dirty="0"/>
+              <a:t>LASTDATE</a:t>
+            </a:r>
+            <a:r>
+              <a:rPr lang="en-GB" dirty="0"/>
+              <a:t> on </a:t>
+            </a:r>
+            <a:r>
+              <a:rPr lang="en-GB" b="1" dirty="0"/>
+              <a:t>PARALLELPERIOD</a:t>
+            </a:r>
+            <a:r>
+              <a:rPr lang="en-GB" dirty="0"/>
+              <a:t>(+1 month)</a:t>
+            </a:r>
+            <a:endParaRPr lang="en-GB" b="1" dirty="0"/>
+          </a:p>
+        </p:txBody>
+      </p:sp>
+      <p:cxnSp>
+        <p:nvCxnSpPr>
+          <p:cNvPr id="21" name="Straight Arrow Connector 20">
+            <a:extLst>
+              <a:ext uri="{FF2B5EF4-FFF2-40B4-BE49-F238E27FC236}">
+                <a16:creationId xmlns:a16="http://schemas.microsoft.com/office/drawing/2014/main" id="{D2AF0FAB-9C1E-495A-BCA3-CABA787B52F4}"/>
+              </a:ext>
+            </a:extLst>
+          </p:cNvPr>
+          <p:cNvCxnSpPr>
+            <a:cxnSpLocks/>
+          </p:cNvCxnSpPr>
+          <p:nvPr/>
+        </p:nvCxnSpPr>
+        <p:spPr>
+          <a:xfrm>
+            <a:off x="9711638" y="1314347"/>
+            <a:ext cx="0" cy="937108"/>
+          </a:xfrm>
+          <a:prstGeom prst="straightConnector1">
+            <a:avLst/>
+          </a:prstGeom>
+          <a:ln w="38100">
+            <a:solidFill>
+              <a:srgbClr val="FFC000"/>
+            </a:solidFill>
+            <a:tailEnd type="triangle"/>
+          </a:ln>
+        </p:spPr>
+        <p:style>
+          <a:lnRef idx="1">
+            <a:schemeClr val="accent1"/>
+          </a:lnRef>
+          <a:fillRef idx="0">
+            <a:schemeClr val="accent1"/>
+          </a:fillRef>
+          <a:effectRef idx="0">
+            <a:schemeClr val="accent1"/>
+          </a:effectRef>
+          <a:fontRef idx="minor">
+            <a:schemeClr val="tx1"/>
+          </a:fontRef>
+        </p:style>
+      </p:cxnSp>
+      <p:sp>
+        <p:nvSpPr>
+          <p:cNvPr id="26" name="Rectangle 25">
+            <a:extLst>
+              <a:ext uri="{FF2B5EF4-FFF2-40B4-BE49-F238E27FC236}">
+                <a16:creationId xmlns:a16="http://schemas.microsoft.com/office/drawing/2014/main" id="{03694CFA-6D4E-405E-9196-AFBA1AC6C8D9}"/>
+              </a:ext>
+            </a:extLst>
+          </p:cNvPr>
+          <p:cNvSpPr/>
+          <p:nvPr/>
+        </p:nvSpPr>
+        <p:spPr>
+          <a:xfrm>
+            <a:off x="6013211" y="2947388"/>
+            <a:ext cx="5110508" cy="206073"/>
+          </a:xfrm>
+          <a:prstGeom prst="rect">
+            <a:avLst/>
+          </a:prstGeom>
+          <a:noFill/>
+          <a:ln w="28575">
+            <a:solidFill>
+              <a:schemeClr val="tx1"/>
+            </a:solidFill>
+          </a:ln>
+        </p:spPr>
+        <p:style>
+          <a:lnRef idx="2">
+            <a:schemeClr val="accent1">
+              <a:shade val="50000"/>
+            </a:schemeClr>
+          </a:lnRef>
+          <a:fillRef idx="1">
+            <a:schemeClr val="accent1"/>
+          </a:fillRef>
+          <a:effectRef idx="0">
+            <a:schemeClr val="accent1"/>
+          </a:effectRef>
+          <a:fontRef idx="minor">
+            <a:schemeClr val="lt1"/>
+          </a:fontRef>
+        </p:style>
+        <p:txBody>
+          <a:bodyPr rtlCol="0" anchor="ctr"/>
+          <a:lstStyle/>
+          <a:p>
+            <a:pPr algn="ctr"/>
+            <a:endParaRPr lang="en-GB"/>
+          </a:p>
+        </p:txBody>
+      </p:sp>
+      <p:sp>
+        <p:nvSpPr>
+          <p:cNvPr id="27" name="TextBox 26">
+            <a:extLst>
+              <a:ext uri="{FF2B5EF4-FFF2-40B4-BE49-F238E27FC236}">
+                <a16:creationId xmlns:a16="http://schemas.microsoft.com/office/drawing/2014/main" id="{7EDB4293-1EA5-4A0D-85C0-B78289DA2E06}"/>
+              </a:ext>
+            </a:extLst>
+          </p:cNvPr>
+          <p:cNvSpPr txBox="1"/>
+          <p:nvPr/>
+        </p:nvSpPr>
+        <p:spPr>
+          <a:xfrm>
+            <a:off x="509586" y="4789847"/>
+            <a:ext cx="9202052" cy="646331"/>
+          </a:xfrm>
+          <a:prstGeom prst="rect">
+            <a:avLst/>
+          </a:prstGeom>
+          <a:noFill/>
+          <a:ln>
+            <a:solidFill>
+              <a:srgbClr val="002060"/>
+            </a:solidFill>
+          </a:ln>
+        </p:spPr>
+        <p:txBody>
+          <a:bodyPr wrap="square" rtlCol="0">
+            <a:spAutoFit/>
+          </a:bodyPr>
+          <a:lstStyle/>
+          <a:p>
+            <a:r>
+              <a:rPr lang="en-GB" dirty="0"/>
+              <a:t>The outcome of </a:t>
+            </a:r>
+            <a:r>
+              <a:rPr lang="en-GB" b="1" dirty="0"/>
+              <a:t>DATEADD</a:t>
+            </a:r>
+            <a:r>
+              <a:rPr lang="en-GB" dirty="0"/>
+              <a:t> is restricted to the Week start and end (15 to 21 Feb)</a:t>
+            </a:r>
+          </a:p>
+          <a:p>
+            <a:r>
+              <a:rPr lang="en-GB" dirty="0"/>
+              <a:t>The outcome of </a:t>
+            </a:r>
+            <a:r>
+              <a:rPr lang="en-GB" b="1" dirty="0"/>
+              <a:t>PARALLELPERIOD</a:t>
+            </a:r>
+            <a:r>
+              <a:rPr lang="en-GB" dirty="0"/>
+              <a:t> stretches to all the dates available in that month (1 to </a:t>
+            </a:r>
+            <a:r>
+              <a:rPr lang="en-GB"/>
+              <a:t>25 Feb)</a:t>
+            </a:r>
+            <a:endParaRPr lang="en-GB" dirty="0"/>
+          </a:p>
+        </p:txBody>
+      </p:sp>
+      <p:cxnSp>
+        <p:nvCxnSpPr>
+          <p:cNvPr id="28" name="Straight Arrow Connector 27">
+            <a:extLst>
+              <a:ext uri="{FF2B5EF4-FFF2-40B4-BE49-F238E27FC236}">
+                <a16:creationId xmlns:a16="http://schemas.microsoft.com/office/drawing/2014/main" id="{48563A24-B82E-409D-A80D-5CA901FBC657}"/>
+              </a:ext>
+            </a:extLst>
+          </p:cNvPr>
+          <p:cNvCxnSpPr>
+            <a:cxnSpLocks/>
+          </p:cNvCxnSpPr>
+          <p:nvPr/>
+        </p:nvCxnSpPr>
+        <p:spPr>
+          <a:xfrm flipV="1">
+            <a:off x="8177282" y="3062796"/>
+            <a:ext cx="0" cy="1892875"/>
+          </a:xfrm>
+          <a:prstGeom prst="straightConnector1">
+            <a:avLst/>
+          </a:prstGeom>
+          <a:ln w="38100">
+            <a:solidFill>
+              <a:schemeClr val="tx1"/>
+            </a:solidFill>
+            <a:tailEnd type="triangle"/>
+          </a:ln>
+        </p:spPr>
+        <p:style>
+          <a:lnRef idx="1">
+            <a:schemeClr val="accent1"/>
+          </a:lnRef>
+          <a:fillRef idx="0">
+            <a:schemeClr val="accent1"/>
+          </a:fillRef>
+          <a:effectRef idx="0">
+            <a:schemeClr val="accent1"/>
+          </a:effectRef>
+          <a:fontRef idx="minor">
+            <a:schemeClr val="tx1"/>
+          </a:fontRef>
+        </p:style>
+      </p:cxnSp>
+    </p:spTree>
+    <p:extLst>
+      <p:ext uri="{BB962C8B-B14F-4D97-AF65-F5344CB8AC3E}">
+        <p14:creationId xmlns:p14="http://schemas.microsoft.com/office/powerpoint/2010/main" val="258212266"/>
+      </p:ext>
+    </p:extLst>
+  </p:cSld>
+  <p:clrMapOvr>
+    <a:masterClrMapping/>
+  </p:clrMapOvr>
+</p:sld>
+</file>
+
+<file path=ppt/slides/slide13.xml><?xml version="1.0" encoding="utf-8"?>
+<p:sld xmlns:a="http://schemas.openxmlformats.org/drawingml/2006/main" xmlns:r="http://schemas.openxmlformats.org/officeDocument/2006/relationships" xmlns:p="http://schemas.openxmlformats.org/presentationml/2006/main">
+  <p:cSld>
+    <p:spTree>
+      <p:nvGrpSpPr>
+        <p:cNvPr id="1" name=""/>
+        <p:cNvGrpSpPr/>
+        <p:nvPr/>
+      </p:nvGrpSpPr>
+      <p:grpSpPr>
+        <a:xfrm>
+          <a:off x="0" y="0"/>
+          <a:ext cx="0" cy="0"/>
+          <a:chOff x="0" y="0"/>
+          <a:chExt cx="0" cy="0"/>
+        </a:xfrm>
+      </p:grpSpPr>
+      <p:pic>
+        <p:nvPicPr>
+          <p:cNvPr id="3" name="Picture 2">
+            <a:extLst>
+              <a:ext uri="{FF2B5EF4-FFF2-40B4-BE49-F238E27FC236}">
+                <a16:creationId xmlns:a16="http://schemas.microsoft.com/office/drawing/2014/main" id="{D722243A-7975-4D2D-8B42-4B8398343473}"/>
+              </a:ext>
+            </a:extLst>
+          </p:cNvPr>
+          <p:cNvPicPr>
+            <a:picLocks noChangeAspect="1"/>
+          </p:cNvPicPr>
+          <p:nvPr/>
+        </p:nvPicPr>
+        <p:blipFill>
+          <a:blip r:embed="rId2"/>
+          <a:stretch>
+            <a:fillRect/>
+          </a:stretch>
+        </p:blipFill>
+        <p:spPr>
+          <a:xfrm>
+            <a:off x="522513" y="0"/>
+            <a:ext cx="11385713" cy="6428848"/>
+          </a:xfrm>
+          <a:prstGeom prst="rect">
+            <a:avLst/>
+          </a:prstGeom>
+        </p:spPr>
+      </p:pic>
+      <p:sp>
+        <p:nvSpPr>
+          <p:cNvPr id="5" name="TextBox 4">
+            <a:extLst>
+              <a:ext uri="{FF2B5EF4-FFF2-40B4-BE49-F238E27FC236}">
+                <a16:creationId xmlns:a16="http://schemas.microsoft.com/office/drawing/2014/main" id="{44DC7D9A-A7D4-4D02-92C8-FC97C67A0892}"/>
+              </a:ext>
+            </a:extLst>
+          </p:cNvPr>
+          <p:cNvSpPr txBox="1"/>
+          <p:nvPr/>
+        </p:nvSpPr>
+        <p:spPr>
+          <a:xfrm>
+            <a:off x="981346" y="4401665"/>
+            <a:ext cx="3096132" cy="954107"/>
+          </a:xfrm>
+          <a:prstGeom prst="rect">
+            <a:avLst/>
+          </a:prstGeom>
+          <a:noFill/>
+          <a:ln>
+            <a:solidFill>
+              <a:schemeClr val="tx1"/>
+            </a:solidFill>
+          </a:ln>
+        </p:spPr>
+        <p:txBody>
+          <a:bodyPr wrap="square" rtlCol="0">
+            <a:spAutoFit/>
+          </a:bodyPr>
+          <a:lstStyle/>
+          <a:p>
+            <a:r>
+              <a:rPr lang="en-GB" sz="1400" dirty="0"/>
+              <a:t>Visual hierarchy using the </a:t>
+            </a:r>
+          </a:p>
+          <a:p>
+            <a:pPr marL="285750" indent="-285750">
+              <a:buFont typeface="Arial" panose="020B0604020202020204" pitchFamily="34" charset="0"/>
+              <a:buChar char="•"/>
+            </a:pPr>
+            <a:r>
+              <a:rPr lang="en-GB" sz="1400" dirty="0"/>
+              <a:t>Financial Year</a:t>
+            </a:r>
+          </a:p>
+          <a:p>
+            <a:pPr marL="285750" indent="-285750">
+              <a:buFont typeface="Arial" panose="020B0604020202020204" pitchFamily="34" charset="0"/>
+              <a:buChar char="•"/>
+            </a:pPr>
+            <a:r>
+              <a:rPr lang="en-GB" sz="1400" dirty="0"/>
+              <a:t>Financial Month</a:t>
+            </a:r>
+            <a:endParaRPr lang="en-GB" sz="1400" b="1" dirty="0"/>
+          </a:p>
+          <a:p>
+            <a:r>
+              <a:rPr lang="en-GB" sz="1400" dirty="0"/>
+              <a:t>columns of the</a:t>
+            </a:r>
+            <a:r>
+              <a:rPr lang="en-GB" sz="1400" b="1" dirty="0"/>
+              <a:t> </a:t>
+            </a:r>
+            <a:r>
+              <a:rPr lang="en-GB" sz="1400" b="1" dirty="0" err="1"/>
+              <a:t>MyCalendar</a:t>
+            </a:r>
+            <a:r>
+              <a:rPr lang="en-GB" sz="1400" b="1" dirty="0"/>
+              <a:t> </a:t>
+            </a:r>
+            <a:r>
+              <a:rPr lang="en-GB" sz="1400" dirty="0"/>
+              <a:t>table</a:t>
+            </a:r>
+            <a:endParaRPr lang="en-GB" sz="1400" b="1" dirty="0"/>
+          </a:p>
+        </p:txBody>
+      </p:sp>
+      <p:sp>
+        <p:nvSpPr>
+          <p:cNvPr id="6" name="TextBox 5">
+            <a:extLst>
+              <a:ext uri="{FF2B5EF4-FFF2-40B4-BE49-F238E27FC236}">
+                <a16:creationId xmlns:a16="http://schemas.microsoft.com/office/drawing/2014/main" id="{8D8DE922-8D57-441D-8811-50A30068BB53}"/>
+              </a:ext>
+            </a:extLst>
+          </p:cNvPr>
+          <p:cNvSpPr txBox="1"/>
+          <p:nvPr/>
+        </p:nvSpPr>
+        <p:spPr>
+          <a:xfrm>
+            <a:off x="5183223" y="4186221"/>
+            <a:ext cx="3096132" cy="1169551"/>
+          </a:xfrm>
+          <a:prstGeom prst="rect">
+            <a:avLst/>
+          </a:prstGeom>
+          <a:noFill/>
+          <a:ln>
+            <a:solidFill>
+              <a:schemeClr val="tx1"/>
+            </a:solidFill>
+          </a:ln>
+        </p:spPr>
+        <p:txBody>
+          <a:bodyPr wrap="square" rtlCol="0">
+            <a:spAutoFit/>
+          </a:bodyPr>
+          <a:lstStyle/>
+          <a:p>
+            <a:r>
+              <a:rPr lang="en-GB" sz="1400" dirty="0"/>
+              <a:t>Visual hierarchy using the </a:t>
+            </a:r>
+          </a:p>
+          <a:p>
+            <a:pPr marL="285750" indent="-285750">
+              <a:buFont typeface="Arial" panose="020B0604020202020204" pitchFamily="34" charset="0"/>
+              <a:buChar char="•"/>
+            </a:pPr>
+            <a:r>
+              <a:rPr lang="en-GB" sz="1400" dirty="0"/>
+              <a:t>Financial Year</a:t>
+            </a:r>
+          </a:p>
+          <a:p>
+            <a:pPr marL="285750" indent="-285750">
+              <a:buFont typeface="Arial" panose="020B0604020202020204" pitchFamily="34" charset="0"/>
+              <a:buChar char="•"/>
+            </a:pPr>
+            <a:r>
+              <a:rPr lang="en-GB" sz="1400" dirty="0"/>
+              <a:t>Financial Quarter</a:t>
+            </a:r>
+          </a:p>
+          <a:p>
+            <a:pPr marL="285750" indent="-285750">
+              <a:buFont typeface="Arial" panose="020B0604020202020204" pitchFamily="34" charset="0"/>
+              <a:buChar char="•"/>
+            </a:pPr>
+            <a:r>
+              <a:rPr lang="en-GB" sz="1400" dirty="0"/>
+              <a:t>Financial Month</a:t>
+            </a:r>
+          </a:p>
+          <a:p>
+            <a:r>
+              <a:rPr lang="en-GB" sz="1400" dirty="0"/>
+              <a:t>columns of the</a:t>
+            </a:r>
+            <a:r>
+              <a:rPr lang="en-GB" sz="1400" b="1" dirty="0"/>
+              <a:t> </a:t>
+            </a:r>
+            <a:r>
+              <a:rPr lang="en-GB" sz="1400" b="1" dirty="0" err="1"/>
+              <a:t>MyCalendar</a:t>
+            </a:r>
+            <a:r>
+              <a:rPr lang="en-GB" sz="1400" b="1" dirty="0"/>
+              <a:t> </a:t>
+            </a:r>
+            <a:r>
+              <a:rPr lang="en-GB" sz="1400" dirty="0"/>
+              <a:t>table</a:t>
+            </a:r>
+            <a:endParaRPr lang="en-GB" sz="1400" b="1" dirty="0"/>
+          </a:p>
+        </p:txBody>
+      </p:sp>
+      <p:cxnSp>
+        <p:nvCxnSpPr>
+          <p:cNvPr id="7" name="Straight Arrow Connector 6">
+            <a:extLst>
+              <a:ext uri="{FF2B5EF4-FFF2-40B4-BE49-F238E27FC236}">
+                <a16:creationId xmlns:a16="http://schemas.microsoft.com/office/drawing/2014/main" id="{A175171D-8190-4570-ABAE-5C18FC349247}"/>
+              </a:ext>
+            </a:extLst>
+          </p:cNvPr>
+          <p:cNvCxnSpPr>
+            <a:cxnSpLocks/>
+          </p:cNvCxnSpPr>
+          <p:nvPr/>
+        </p:nvCxnSpPr>
+        <p:spPr>
+          <a:xfrm flipV="1">
+            <a:off x="2134411" y="3057217"/>
+            <a:ext cx="0" cy="1270990"/>
+          </a:xfrm>
+          <a:prstGeom prst="straightConnector1">
+            <a:avLst/>
+          </a:prstGeom>
+          <a:ln w="38100">
+            <a:solidFill>
+              <a:srgbClr val="00B0F0"/>
+            </a:solidFill>
+            <a:tailEnd type="triangle"/>
+          </a:ln>
+        </p:spPr>
+        <p:style>
+          <a:lnRef idx="1">
+            <a:schemeClr val="accent1"/>
+          </a:lnRef>
+          <a:fillRef idx="0">
+            <a:schemeClr val="accent1"/>
+          </a:fillRef>
+          <a:effectRef idx="0">
+            <a:schemeClr val="accent1"/>
+          </a:effectRef>
+          <a:fontRef idx="minor">
+            <a:schemeClr val="tx1"/>
+          </a:fontRef>
+        </p:style>
+      </p:cxnSp>
+      <p:cxnSp>
+        <p:nvCxnSpPr>
+          <p:cNvPr id="9" name="Straight Arrow Connector 8">
+            <a:extLst>
+              <a:ext uri="{FF2B5EF4-FFF2-40B4-BE49-F238E27FC236}">
+                <a16:creationId xmlns:a16="http://schemas.microsoft.com/office/drawing/2014/main" id="{663E6EE7-FCEC-458E-9649-68734178C95E}"/>
+              </a:ext>
+            </a:extLst>
+          </p:cNvPr>
+          <p:cNvCxnSpPr>
+            <a:cxnSpLocks/>
+          </p:cNvCxnSpPr>
+          <p:nvPr/>
+        </p:nvCxnSpPr>
+        <p:spPr>
+          <a:xfrm flipV="1">
+            <a:off x="5888427" y="2793505"/>
+            <a:ext cx="0" cy="1270990"/>
+          </a:xfrm>
+          <a:prstGeom prst="straightConnector1">
+            <a:avLst/>
+          </a:prstGeom>
+          <a:ln w="38100">
+            <a:solidFill>
+              <a:srgbClr val="00B0F0"/>
+            </a:solidFill>
+            <a:tailEnd type="triangle"/>
+          </a:ln>
+        </p:spPr>
+        <p:style>
+          <a:lnRef idx="1">
+            <a:schemeClr val="accent1"/>
+          </a:lnRef>
+          <a:fillRef idx="0">
+            <a:schemeClr val="accent1"/>
+          </a:fillRef>
+          <a:effectRef idx="0">
+            <a:schemeClr val="accent1"/>
+          </a:effectRef>
+          <a:fontRef idx="minor">
+            <a:schemeClr val="tx1"/>
+          </a:fontRef>
+        </p:style>
+      </p:cxnSp>
+      <p:sp>
+        <p:nvSpPr>
+          <p:cNvPr id="10" name="TextBox 9">
+            <a:extLst>
+              <a:ext uri="{FF2B5EF4-FFF2-40B4-BE49-F238E27FC236}">
+                <a16:creationId xmlns:a16="http://schemas.microsoft.com/office/drawing/2014/main" id="{43A6A290-C34F-4129-84B2-0FCCDAFAB88A}"/>
+              </a:ext>
+            </a:extLst>
+          </p:cNvPr>
+          <p:cNvSpPr txBox="1"/>
+          <p:nvPr/>
+        </p:nvSpPr>
+        <p:spPr>
+          <a:xfrm>
+            <a:off x="8685311" y="4186221"/>
+            <a:ext cx="3096132" cy="523220"/>
+          </a:xfrm>
+          <a:prstGeom prst="rect">
+            <a:avLst/>
+          </a:prstGeom>
+          <a:noFill/>
+          <a:ln>
+            <a:solidFill>
+              <a:schemeClr val="tx1"/>
+            </a:solidFill>
+          </a:ln>
+        </p:spPr>
+        <p:txBody>
+          <a:bodyPr wrap="square" rtlCol="0">
+            <a:spAutoFit/>
+          </a:bodyPr>
+          <a:lstStyle/>
+          <a:p>
+            <a:r>
+              <a:rPr lang="en-GB" sz="1400" dirty="0"/>
+              <a:t>Slicer on </a:t>
+            </a:r>
+            <a:r>
+              <a:rPr lang="en-GB" sz="1400" b="1" dirty="0"/>
+              <a:t>Financial Year</a:t>
+            </a:r>
+            <a:r>
+              <a:rPr lang="en-GB" sz="1400" dirty="0"/>
+              <a:t> column of of the</a:t>
+            </a:r>
+            <a:r>
+              <a:rPr lang="en-GB" sz="1400" b="1" dirty="0"/>
+              <a:t> </a:t>
+            </a:r>
+            <a:r>
+              <a:rPr lang="en-GB" sz="1400" b="1" dirty="0" err="1"/>
+              <a:t>MyCalendar</a:t>
+            </a:r>
+            <a:r>
+              <a:rPr lang="en-GB" sz="1400" b="1" dirty="0"/>
+              <a:t> </a:t>
+            </a:r>
+            <a:r>
+              <a:rPr lang="en-GB" sz="1400" dirty="0"/>
+              <a:t>table</a:t>
+            </a:r>
+            <a:endParaRPr lang="en-GB" sz="1400" b="1" dirty="0"/>
+          </a:p>
+        </p:txBody>
+      </p:sp>
+      <p:cxnSp>
+        <p:nvCxnSpPr>
+          <p:cNvPr id="11" name="Straight Arrow Connector 10">
+            <a:extLst>
+              <a:ext uri="{FF2B5EF4-FFF2-40B4-BE49-F238E27FC236}">
+                <a16:creationId xmlns:a16="http://schemas.microsoft.com/office/drawing/2014/main" id="{AAD903E9-C56F-475A-B318-561C3AC362FE}"/>
+              </a:ext>
+            </a:extLst>
+          </p:cNvPr>
+          <p:cNvCxnSpPr>
+            <a:cxnSpLocks/>
+          </p:cNvCxnSpPr>
+          <p:nvPr/>
+        </p:nvCxnSpPr>
+        <p:spPr>
+          <a:xfrm flipV="1">
+            <a:off x="10108972" y="2211355"/>
+            <a:ext cx="0" cy="1853140"/>
+          </a:xfrm>
+          <a:prstGeom prst="straightConnector1">
+            <a:avLst/>
+          </a:prstGeom>
+          <a:ln w="38100">
+            <a:solidFill>
+              <a:srgbClr val="00B0F0"/>
+            </a:solidFill>
+            <a:tailEnd type="triangle"/>
+          </a:ln>
+        </p:spPr>
+        <p:style>
+          <a:lnRef idx="1">
+            <a:schemeClr val="accent1"/>
+          </a:lnRef>
+          <a:fillRef idx="0">
+            <a:schemeClr val="accent1"/>
+          </a:fillRef>
+          <a:effectRef idx="0">
+            <a:schemeClr val="accent1"/>
+          </a:effectRef>
+          <a:fontRef idx="minor">
+            <a:schemeClr val="tx1"/>
+          </a:fontRef>
+        </p:style>
+      </p:cxnSp>
+      <p:sp>
+        <p:nvSpPr>
+          <p:cNvPr id="13" name="Rectangle 12">
+            <a:extLst>
+              <a:ext uri="{FF2B5EF4-FFF2-40B4-BE49-F238E27FC236}">
+                <a16:creationId xmlns:a16="http://schemas.microsoft.com/office/drawing/2014/main" id="{5D69CA70-AD6C-4E99-801C-BF97EAA2D5A3}"/>
+              </a:ext>
+            </a:extLst>
+          </p:cNvPr>
+          <p:cNvSpPr/>
+          <p:nvPr/>
+        </p:nvSpPr>
+        <p:spPr>
+          <a:xfrm>
+            <a:off x="3214769" y="1352347"/>
+            <a:ext cx="862710" cy="2445212"/>
+          </a:xfrm>
+          <a:prstGeom prst="rect">
+            <a:avLst/>
+          </a:prstGeom>
+          <a:noFill/>
+          <a:ln w="28575">
+            <a:solidFill>
+              <a:srgbClr val="FFC000"/>
+            </a:solidFill>
+          </a:ln>
+        </p:spPr>
+        <p:style>
+          <a:lnRef idx="2">
+            <a:schemeClr val="accent1">
+              <a:shade val="50000"/>
+            </a:schemeClr>
+          </a:lnRef>
+          <a:fillRef idx="1">
+            <a:schemeClr val="accent1"/>
+          </a:fillRef>
+          <a:effectRef idx="0">
+            <a:schemeClr val="accent1"/>
+          </a:effectRef>
+          <a:fontRef idx="minor">
+            <a:schemeClr val="lt1"/>
+          </a:fontRef>
+        </p:style>
+        <p:txBody>
+          <a:bodyPr rtlCol="0" anchor="ctr"/>
+          <a:lstStyle/>
+          <a:p>
+            <a:pPr algn="ctr"/>
+            <a:endParaRPr lang="en-GB"/>
+          </a:p>
+        </p:txBody>
+      </p:sp>
+      <p:sp>
+        <p:nvSpPr>
+          <p:cNvPr id="14" name="Rectangle 13">
+            <a:extLst>
+              <a:ext uri="{FF2B5EF4-FFF2-40B4-BE49-F238E27FC236}">
+                <a16:creationId xmlns:a16="http://schemas.microsoft.com/office/drawing/2014/main" id="{DE69E3B9-5075-4EED-9EC1-C145643D2D8D}"/>
+              </a:ext>
+            </a:extLst>
+          </p:cNvPr>
+          <p:cNvSpPr/>
+          <p:nvPr/>
+        </p:nvSpPr>
+        <p:spPr>
+          <a:xfrm>
+            <a:off x="7158135" y="1352347"/>
+            <a:ext cx="862710" cy="1577465"/>
+          </a:xfrm>
+          <a:prstGeom prst="rect">
+            <a:avLst/>
+          </a:prstGeom>
+          <a:noFill/>
+          <a:ln w="28575">
+            <a:solidFill>
+              <a:srgbClr val="FFC000"/>
+            </a:solidFill>
+          </a:ln>
+        </p:spPr>
+        <p:style>
+          <a:lnRef idx="2">
+            <a:schemeClr val="accent1">
+              <a:shade val="50000"/>
+            </a:schemeClr>
+          </a:lnRef>
+          <a:fillRef idx="1">
+            <a:schemeClr val="accent1"/>
+          </a:fillRef>
+          <a:effectRef idx="0">
+            <a:schemeClr val="accent1"/>
+          </a:effectRef>
+          <a:fontRef idx="minor">
+            <a:schemeClr val="lt1"/>
+          </a:fontRef>
+        </p:style>
+        <p:txBody>
+          <a:bodyPr rtlCol="0" anchor="ctr"/>
+          <a:lstStyle/>
+          <a:p>
+            <a:pPr algn="ctr"/>
+            <a:endParaRPr lang="en-GB"/>
+          </a:p>
+        </p:txBody>
+      </p:sp>
+      <p:sp>
+        <p:nvSpPr>
+          <p:cNvPr id="15" name="TextBox 14">
+            <a:extLst>
+              <a:ext uri="{FF2B5EF4-FFF2-40B4-BE49-F238E27FC236}">
+                <a16:creationId xmlns:a16="http://schemas.microsoft.com/office/drawing/2014/main" id="{2079AA60-B8EA-4B2D-88C1-E92869EFF364}"/>
+              </a:ext>
+            </a:extLst>
+          </p:cNvPr>
+          <p:cNvSpPr txBox="1"/>
+          <p:nvPr/>
+        </p:nvSpPr>
+        <p:spPr>
+          <a:xfrm>
+            <a:off x="3993509" y="152954"/>
+            <a:ext cx="3732237" cy="307777"/>
+          </a:xfrm>
+          <a:prstGeom prst="rect">
+            <a:avLst/>
+          </a:prstGeom>
+          <a:noFill/>
+          <a:ln>
+            <a:solidFill>
+              <a:schemeClr val="tx1"/>
+            </a:solidFill>
+          </a:ln>
+        </p:spPr>
+        <p:txBody>
+          <a:bodyPr wrap="square" rtlCol="0">
+            <a:spAutoFit/>
+          </a:bodyPr>
+          <a:lstStyle/>
+          <a:p>
+            <a:r>
+              <a:rPr lang="en-GB" sz="1400" dirty="0"/>
+              <a:t>Custom measure </a:t>
+            </a:r>
+            <a:r>
+              <a:rPr lang="en-GB" sz="1400" b="1" dirty="0">
+                <a:effectLst/>
+                <a:latin typeface="Arial" panose="020B0604020202020204" pitchFamily="34" charset="0"/>
+              </a:rPr>
+              <a:t>% </a:t>
+            </a:r>
+            <a:r>
+              <a:rPr lang="en-GB" sz="1400" b="1" dirty="0" err="1">
+                <a:effectLst/>
+                <a:latin typeface="Arial" panose="020B0604020202020204" pitchFamily="34" charset="0"/>
+              </a:rPr>
+              <a:t>OfAnnualSalesInPeriod</a:t>
+            </a:r>
+            <a:endParaRPr lang="en-GB" sz="1400" b="1" dirty="0"/>
+          </a:p>
+        </p:txBody>
+      </p:sp>
+      <p:cxnSp>
+        <p:nvCxnSpPr>
+          <p:cNvPr id="17" name="Connector: Elbow 16">
+            <a:extLst>
+              <a:ext uri="{FF2B5EF4-FFF2-40B4-BE49-F238E27FC236}">
+                <a16:creationId xmlns:a16="http://schemas.microsoft.com/office/drawing/2014/main" id="{CA00C70A-1E24-44CA-A8CC-EF7224EB6792}"/>
+              </a:ext>
+            </a:extLst>
+          </p:cNvPr>
+          <p:cNvCxnSpPr>
+            <a:cxnSpLocks/>
+            <a:stCxn id="15" idx="1"/>
+          </p:cNvCxnSpPr>
+          <p:nvPr/>
+        </p:nvCxnSpPr>
+        <p:spPr>
+          <a:xfrm rot="10800000" flipV="1">
+            <a:off x="3713595" y="306843"/>
+            <a:ext cx="279915" cy="1045498"/>
+          </a:xfrm>
+          <a:prstGeom prst="bentConnector2">
+            <a:avLst/>
+          </a:prstGeom>
+          <a:ln w="28575">
+            <a:solidFill>
+              <a:srgbClr val="FFC000"/>
+            </a:solidFill>
+            <a:tailEnd type="triangle"/>
+          </a:ln>
+        </p:spPr>
+        <p:style>
+          <a:lnRef idx="1">
+            <a:schemeClr val="accent1"/>
+          </a:lnRef>
+          <a:fillRef idx="0">
+            <a:schemeClr val="accent1"/>
+          </a:fillRef>
+          <a:effectRef idx="0">
+            <a:schemeClr val="accent1"/>
+          </a:effectRef>
+          <a:fontRef idx="minor">
+            <a:schemeClr val="tx1"/>
+          </a:fontRef>
+        </p:style>
+      </p:cxnSp>
+      <p:cxnSp>
+        <p:nvCxnSpPr>
+          <p:cNvPr id="19" name="Connector: Elbow 18">
+            <a:extLst>
+              <a:ext uri="{FF2B5EF4-FFF2-40B4-BE49-F238E27FC236}">
+                <a16:creationId xmlns:a16="http://schemas.microsoft.com/office/drawing/2014/main" id="{9F3DF1C4-13DE-4E80-9C7A-BD34B4113C7D}"/>
+              </a:ext>
+            </a:extLst>
+          </p:cNvPr>
+          <p:cNvCxnSpPr>
+            <a:cxnSpLocks/>
+          </p:cNvCxnSpPr>
+          <p:nvPr/>
+        </p:nvCxnSpPr>
+        <p:spPr>
+          <a:xfrm rot="16200000" flipH="1">
+            <a:off x="6968414" y="662091"/>
+            <a:ext cx="1025773" cy="488891"/>
+          </a:xfrm>
+          <a:prstGeom prst="bentConnector3">
+            <a:avLst>
+              <a:gd name="adj1" fmla="val 50000"/>
+            </a:avLst>
+          </a:prstGeom>
+          <a:ln w="28575">
+            <a:solidFill>
+              <a:srgbClr val="FFC000"/>
+            </a:solidFill>
+            <a:tailEnd type="triangle"/>
+          </a:ln>
+        </p:spPr>
+        <p:style>
+          <a:lnRef idx="1">
+            <a:schemeClr val="accent1"/>
+          </a:lnRef>
+          <a:fillRef idx="0">
+            <a:schemeClr val="accent1"/>
+          </a:fillRef>
+          <a:effectRef idx="0">
+            <a:schemeClr val="accent1"/>
+          </a:effectRef>
+          <a:fontRef idx="minor">
+            <a:schemeClr val="tx1"/>
+          </a:fontRef>
+        </p:style>
+      </p:cxnSp>
+    </p:spTree>
+    <p:extLst>
+      <p:ext uri="{BB962C8B-B14F-4D97-AF65-F5344CB8AC3E}">
+        <p14:creationId xmlns:p14="http://schemas.microsoft.com/office/powerpoint/2010/main" val="2280444877"/>
+      </p:ext>
+    </p:extLst>
+  </p:cSld>
+  <p:clrMapOvr>
+    <a:masterClrMapping/>
+  </p:clrMapOvr>
+</p:sld>
+</file>
+
 <file path=ppt/slides/slide2.xml><?xml version="1.0" encoding="utf-8"?>
 <p:sld xmlns:a="http://schemas.openxmlformats.org/drawingml/2006/main" xmlns:r="http://schemas.openxmlformats.org/officeDocument/2006/relationships" xmlns:p="http://schemas.openxmlformats.org/presentationml/2006/main">
   <p:cSld>
@@ -7983,7 +9366,7 @@
         </p:nvCxnSpPr>
         <p:spPr>
           <a:xfrm>
-            <a:off x="4434751" y="1117190"/>
+            <a:off x="4412199" y="1128400"/>
             <a:ext cx="2020284" cy="900909"/>
           </a:xfrm>
           <a:prstGeom prst="straightConnector1">

</xml_diff>

<commit_message>
Completed percentage sales in a month
</commit_message>
<xml_diff>
--- a/dax-cheat-sheet-2/Microsoft PowerPoint Presentation.pptx
+++ b/dax-cheat-sheet-2/Microsoft PowerPoint Presentation.pptx
@@ -18,6 +18,8 @@
     <p:sldId id="266" r:id="rId12"/>
     <p:sldId id="267" r:id="rId13"/>
     <p:sldId id="268" r:id="rId14"/>
+    <p:sldId id="269" r:id="rId15"/>
+    <p:sldId id="270" r:id="rId16"/>
   </p:sldIdLst>
   <p:sldSz cx="12192000" cy="6858000"/>
   <p:notesSz cx="6858000" cy="9144000"/>
@@ -284,7 +286,7 @@
           <a:p>
             <a:fld id="{E38C79C0-5688-4651-9335-8FE2F7340D3C}" type="datetimeFigureOut">
               <a:rPr lang="en-GB" smtClean="0"/>
-              <a:t>01/08/2021</a:t>
+              <a:t>02/08/2021</a:t>
             </a:fld>
             <a:endParaRPr lang="en-GB"/>
           </a:p>
@@ -484,7 +486,7 @@
           <a:p>
             <a:fld id="{E38C79C0-5688-4651-9335-8FE2F7340D3C}" type="datetimeFigureOut">
               <a:rPr lang="en-GB" smtClean="0"/>
-              <a:t>01/08/2021</a:t>
+              <a:t>02/08/2021</a:t>
             </a:fld>
             <a:endParaRPr lang="en-GB"/>
           </a:p>
@@ -694,7 +696,7 @@
           <a:p>
             <a:fld id="{E38C79C0-5688-4651-9335-8FE2F7340D3C}" type="datetimeFigureOut">
               <a:rPr lang="en-GB" smtClean="0"/>
-              <a:t>01/08/2021</a:t>
+              <a:t>02/08/2021</a:t>
             </a:fld>
             <a:endParaRPr lang="en-GB"/>
           </a:p>
@@ -894,7 +896,7 @@
           <a:p>
             <a:fld id="{E38C79C0-5688-4651-9335-8FE2F7340D3C}" type="datetimeFigureOut">
               <a:rPr lang="en-GB" smtClean="0"/>
-              <a:t>01/08/2021</a:t>
+              <a:t>02/08/2021</a:t>
             </a:fld>
             <a:endParaRPr lang="en-GB"/>
           </a:p>
@@ -1170,7 +1172,7 @@
           <a:p>
             <a:fld id="{E38C79C0-5688-4651-9335-8FE2F7340D3C}" type="datetimeFigureOut">
               <a:rPr lang="en-GB" smtClean="0"/>
-              <a:t>01/08/2021</a:t>
+              <a:t>02/08/2021</a:t>
             </a:fld>
             <a:endParaRPr lang="en-GB"/>
           </a:p>
@@ -1438,7 +1440,7 @@
           <a:p>
             <a:fld id="{E38C79C0-5688-4651-9335-8FE2F7340D3C}" type="datetimeFigureOut">
               <a:rPr lang="en-GB" smtClean="0"/>
-              <a:t>01/08/2021</a:t>
+              <a:t>02/08/2021</a:t>
             </a:fld>
             <a:endParaRPr lang="en-GB"/>
           </a:p>
@@ -1853,7 +1855,7 @@
           <a:p>
             <a:fld id="{E38C79C0-5688-4651-9335-8FE2F7340D3C}" type="datetimeFigureOut">
               <a:rPr lang="en-GB" smtClean="0"/>
-              <a:t>01/08/2021</a:t>
+              <a:t>02/08/2021</a:t>
             </a:fld>
             <a:endParaRPr lang="en-GB"/>
           </a:p>
@@ -1995,7 +1997,7 @@
           <a:p>
             <a:fld id="{E38C79C0-5688-4651-9335-8FE2F7340D3C}" type="datetimeFigureOut">
               <a:rPr lang="en-GB" smtClean="0"/>
-              <a:t>01/08/2021</a:t>
+              <a:t>02/08/2021</a:t>
             </a:fld>
             <a:endParaRPr lang="en-GB"/>
           </a:p>
@@ -2108,7 +2110,7 @@
           <a:p>
             <a:fld id="{E38C79C0-5688-4651-9335-8FE2F7340D3C}" type="datetimeFigureOut">
               <a:rPr lang="en-GB" smtClean="0"/>
-              <a:t>01/08/2021</a:t>
+              <a:t>02/08/2021</a:t>
             </a:fld>
             <a:endParaRPr lang="en-GB"/>
           </a:p>
@@ -2421,7 +2423,7 @@
           <a:p>
             <a:fld id="{E38C79C0-5688-4651-9335-8FE2F7340D3C}" type="datetimeFigureOut">
               <a:rPr lang="en-GB" smtClean="0"/>
-              <a:t>01/08/2021</a:t>
+              <a:t>02/08/2021</a:t>
             </a:fld>
             <a:endParaRPr lang="en-GB"/>
           </a:p>
@@ -2710,7 +2712,7 @@
           <a:p>
             <a:fld id="{E38C79C0-5688-4651-9335-8FE2F7340D3C}" type="datetimeFigureOut">
               <a:rPr lang="en-GB" smtClean="0"/>
-              <a:t>01/08/2021</a:t>
+              <a:t>02/08/2021</a:t>
             </a:fld>
             <a:endParaRPr lang="en-GB"/>
           </a:p>
@@ -2953,7 +2955,7 @@
           <a:p>
             <a:fld id="{E38C79C0-5688-4651-9335-8FE2F7340D3C}" type="datetimeFigureOut">
               <a:rPr lang="en-GB" smtClean="0"/>
-              <a:t>01/08/2021</a:t>
+              <a:t>02/08/2021</a:t>
             </a:fld>
             <a:endParaRPr lang="en-GB"/>
           </a:p>
@@ -5586,6 +5588,1137 @@
 </p:sld>
 </file>
 
+<file path=ppt/slides/slide14.xml><?xml version="1.0" encoding="utf-8"?>
+<p:sld xmlns:a="http://schemas.openxmlformats.org/drawingml/2006/main" xmlns:r="http://schemas.openxmlformats.org/officeDocument/2006/relationships" xmlns:p="http://schemas.openxmlformats.org/presentationml/2006/main">
+  <p:cSld>
+    <p:spTree>
+      <p:nvGrpSpPr>
+        <p:cNvPr id="1" name=""/>
+        <p:cNvGrpSpPr/>
+        <p:nvPr/>
+      </p:nvGrpSpPr>
+      <p:grpSpPr>
+        <a:xfrm>
+          <a:off x="0" y="0"/>
+          <a:ext cx="0" cy="0"/>
+          <a:chOff x="0" y="0"/>
+          <a:chExt cx="0" cy="0"/>
+        </a:xfrm>
+      </p:grpSpPr>
+      <p:pic>
+        <p:nvPicPr>
+          <p:cNvPr id="3" name="Picture 2">
+            <a:extLst>
+              <a:ext uri="{FF2B5EF4-FFF2-40B4-BE49-F238E27FC236}">
+                <a16:creationId xmlns:a16="http://schemas.microsoft.com/office/drawing/2014/main" id="{69649FD4-FBDA-48F9-96F3-8B0120D3CD4D}"/>
+              </a:ext>
+            </a:extLst>
+          </p:cNvPr>
+          <p:cNvPicPr>
+            <a:picLocks noChangeAspect="1"/>
+          </p:cNvPicPr>
+          <p:nvPr/>
+        </p:nvPicPr>
+        <p:blipFill>
+          <a:blip r:embed="rId2"/>
+          <a:stretch>
+            <a:fillRect/>
+          </a:stretch>
+        </p:blipFill>
+        <p:spPr>
+          <a:xfrm>
+            <a:off x="3714750" y="1438275"/>
+            <a:ext cx="4762500" cy="3981450"/>
+          </a:xfrm>
+          <a:prstGeom prst="rect">
+            <a:avLst/>
+          </a:prstGeom>
+        </p:spPr>
+      </p:pic>
+      <p:sp>
+        <p:nvSpPr>
+          <p:cNvPr id="4" name="Rectangle 3">
+            <a:extLst>
+              <a:ext uri="{FF2B5EF4-FFF2-40B4-BE49-F238E27FC236}">
+                <a16:creationId xmlns:a16="http://schemas.microsoft.com/office/drawing/2014/main" id="{98EB9DFE-A66C-40C7-A9D6-EBA65CAC2636}"/>
+              </a:ext>
+            </a:extLst>
+          </p:cNvPr>
+          <p:cNvSpPr/>
+          <p:nvPr/>
+        </p:nvSpPr>
+        <p:spPr>
+          <a:xfrm>
+            <a:off x="4316476" y="4443997"/>
+            <a:ext cx="1533818" cy="239970"/>
+          </a:xfrm>
+          <a:prstGeom prst="rect">
+            <a:avLst/>
+          </a:prstGeom>
+          <a:noFill/>
+          <a:ln w="28575">
+            <a:solidFill>
+              <a:srgbClr val="FFC000"/>
+            </a:solidFill>
+          </a:ln>
+        </p:spPr>
+        <p:style>
+          <a:lnRef idx="2">
+            <a:schemeClr val="accent1">
+              <a:shade val="50000"/>
+            </a:schemeClr>
+          </a:lnRef>
+          <a:fillRef idx="1">
+            <a:schemeClr val="accent1"/>
+          </a:fillRef>
+          <a:effectRef idx="0">
+            <a:schemeClr val="accent1"/>
+          </a:effectRef>
+          <a:fontRef idx="minor">
+            <a:schemeClr val="lt1"/>
+          </a:fontRef>
+        </p:style>
+        <p:txBody>
+          <a:bodyPr rtlCol="0" anchor="ctr"/>
+          <a:lstStyle/>
+          <a:p>
+            <a:pPr algn="ctr"/>
+            <a:endParaRPr lang="en-GB"/>
+          </a:p>
+        </p:txBody>
+      </p:sp>
+      <p:sp>
+        <p:nvSpPr>
+          <p:cNvPr id="5" name="TextBox 4">
+            <a:extLst>
+              <a:ext uri="{FF2B5EF4-FFF2-40B4-BE49-F238E27FC236}">
+                <a16:creationId xmlns:a16="http://schemas.microsoft.com/office/drawing/2014/main" id="{2294C430-5556-40ED-B502-350AD8A7F4E3}"/>
+              </a:ext>
+            </a:extLst>
+          </p:cNvPr>
+          <p:cNvSpPr txBox="1"/>
+          <p:nvPr/>
+        </p:nvSpPr>
+        <p:spPr>
+          <a:xfrm>
+            <a:off x="279926" y="3754570"/>
+            <a:ext cx="3732237" cy="307777"/>
+          </a:xfrm>
+          <a:prstGeom prst="rect">
+            <a:avLst/>
+          </a:prstGeom>
+          <a:noFill/>
+          <a:ln>
+            <a:solidFill>
+              <a:schemeClr val="tx1"/>
+            </a:solidFill>
+          </a:ln>
+        </p:spPr>
+        <p:txBody>
+          <a:bodyPr wrap="square" rtlCol="0">
+            <a:spAutoFit/>
+          </a:bodyPr>
+          <a:lstStyle/>
+          <a:p>
+            <a:r>
+              <a:rPr lang="en-GB" sz="1400" dirty="0"/>
+              <a:t>The financial year starts on </a:t>
+            </a:r>
+            <a:r>
+              <a:rPr lang="en-GB" sz="1400" b="1" dirty="0"/>
+              <a:t>July 1st</a:t>
+            </a:r>
+          </a:p>
+        </p:txBody>
+      </p:sp>
+      <p:cxnSp>
+        <p:nvCxnSpPr>
+          <p:cNvPr id="7" name="Connector: Elbow 6">
+            <a:extLst>
+              <a:ext uri="{FF2B5EF4-FFF2-40B4-BE49-F238E27FC236}">
+                <a16:creationId xmlns:a16="http://schemas.microsoft.com/office/drawing/2014/main" id="{8B1BF9DB-2311-4D15-A58A-22A70B278808}"/>
+              </a:ext>
+            </a:extLst>
+          </p:cNvPr>
+          <p:cNvCxnSpPr>
+            <a:stCxn id="5" idx="2"/>
+          </p:cNvCxnSpPr>
+          <p:nvPr/>
+        </p:nvCxnSpPr>
+        <p:spPr>
+          <a:xfrm rot="16200000" flipH="1">
+            <a:off x="2926914" y="3281477"/>
+            <a:ext cx="500322" cy="2062061"/>
+          </a:xfrm>
+          <a:prstGeom prst="bentConnector2">
+            <a:avLst/>
+          </a:prstGeom>
+          <a:ln w="28575">
+            <a:solidFill>
+              <a:srgbClr val="FFC000"/>
+            </a:solidFill>
+            <a:tailEnd type="triangle"/>
+          </a:ln>
+        </p:spPr>
+        <p:style>
+          <a:lnRef idx="1">
+            <a:schemeClr val="accent1"/>
+          </a:lnRef>
+          <a:fillRef idx="0">
+            <a:schemeClr val="accent1"/>
+          </a:fillRef>
+          <a:effectRef idx="0">
+            <a:schemeClr val="accent1"/>
+          </a:effectRef>
+          <a:fontRef idx="minor">
+            <a:schemeClr val="tx1"/>
+          </a:fontRef>
+        </p:style>
+      </p:cxnSp>
+      <p:sp>
+        <p:nvSpPr>
+          <p:cNvPr id="8" name="Rectangle 7">
+            <a:extLst>
+              <a:ext uri="{FF2B5EF4-FFF2-40B4-BE49-F238E27FC236}">
+                <a16:creationId xmlns:a16="http://schemas.microsoft.com/office/drawing/2014/main" id="{2D25DC0D-0AAD-4E09-AAF9-527604FB8C09}"/>
+              </a:ext>
+            </a:extLst>
+          </p:cNvPr>
+          <p:cNvSpPr/>
+          <p:nvPr/>
+        </p:nvSpPr>
+        <p:spPr>
+          <a:xfrm>
+            <a:off x="6074224" y="4689698"/>
+            <a:ext cx="830429" cy="239970"/>
+          </a:xfrm>
+          <a:prstGeom prst="rect">
+            <a:avLst/>
+          </a:prstGeom>
+          <a:noFill/>
+          <a:ln w="28575">
+            <a:solidFill>
+              <a:srgbClr val="FFC000"/>
+            </a:solidFill>
+          </a:ln>
+        </p:spPr>
+        <p:style>
+          <a:lnRef idx="2">
+            <a:schemeClr val="accent1">
+              <a:shade val="50000"/>
+            </a:schemeClr>
+          </a:lnRef>
+          <a:fillRef idx="1">
+            <a:schemeClr val="accent1"/>
+          </a:fillRef>
+          <a:effectRef idx="0">
+            <a:schemeClr val="accent1"/>
+          </a:effectRef>
+          <a:fontRef idx="minor">
+            <a:schemeClr val="lt1"/>
+          </a:fontRef>
+        </p:style>
+        <p:txBody>
+          <a:bodyPr rtlCol="0" anchor="ctr"/>
+          <a:lstStyle/>
+          <a:p>
+            <a:pPr algn="ctr"/>
+            <a:endParaRPr lang="en-GB"/>
+          </a:p>
+        </p:txBody>
+      </p:sp>
+      <p:sp>
+        <p:nvSpPr>
+          <p:cNvPr id="9" name="Rectangle 8">
+            <a:extLst>
+              <a:ext uri="{FF2B5EF4-FFF2-40B4-BE49-F238E27FC236}">
+                <a16:creationId xmlns:a16="http://schemas.microsoft.com/office/drawing/2014/main" id="{7BAA3B11-10B9-4C01-83F6-23A5C27095FD}"/>
+              </a:ext>
+            </a:extLst>
+          </p:cNvPr>
+          <p:cNvSpPr/>
+          <p:nvPr/>
+        </p:nvSpPr>
+        <p:spPr>
+          <a:xfrm>
+            <a:off x="7119252" y="4666625"/>
+            <a:ext cx="830429" cy="239970"/>
+          </a:xfrm>
+          <a:prstGeom prst="rect">
+            <a:avLst/>
+          </a:prstGeom>
+          <a:noFill/>
+          <a:ln w="28575">
+            <a:solidFill>
+              <a:srgbClr val="FFC000"/>
+            </a:solidFill>
+          </a:ln>
+        </p:spPr>
+        <p:style>
+          <a:lnRef idx="2">
+            <a:schemeClr val="accent1">
+              <a:shade val="50000"/>
+            </a:schemeClr>
+          </a:lnRef>
+          <a:fillRef idx="1">
+            <a:schemeClr val="accent1"/>
+          </a:fillRef>
+          <a:effectRef idx="0">
+            <a:schemeClr val="accent1"/>
+          </a:effectRef>
+          <a:fontRef idx="minor">
+            <a:schemeClr val="lt1"/>
+          </a:fontRef>
+        </p:style>
+        <p:txBody>
+          <a:bodyPr rtlCol="0" anchor="ctr"/>
+          <a:lstStyle/>
+          <a:p>
+            <a:pPr algn="ctr"/>
+            <a:endParaRPr lang="en-GB"/>
+          </a:p>
+        </p:txBody>
+      </p:sp>
+      <p:sp>
+        <p:nvSpPr>
+          <p:cNvPr id="10" name="TextBox 9">
+            <a:extLst>
+              <a:ext uri="{FF2B5EF4-FFF2-40B4-BE49-F238E27FC236}">
+                <a16:creationId xmlns:a16="http://schemas.microsoft.com/office/drawing/2014/main" id="{E4F04931-79E8-4C4F-9442-E340EB6C8EDA}"/>
+              </a:ext>
+            </a:extLst>
+          </p:cNvPr>
+          <p:cNvSpPr txBox="1"/>
+          <p:nvPr/>
+        </p:nvSpPr>
+        <p:spPr>
+          <a:xfrm>
+            <a:off x="4963887" y="5810415"/>
+            <a:ext cx="2155366" cy="307777"/>
+          </a:xfrm>
+          <a:prstGeom prst="rect">
+            <a:avLst/>
+          </a:prstGeom>
+          <a:noFill/>
+          <a:ln>
+            <a:solidFill>
+              <a:schemeClr val="tx1"/>
+            </a:solidFill>
+          </a:ln>
+        </p:spPr>
+        <p:txBody>
+          <a:bodyPr wrap="square" rtlCol="0">
+            <a:spAutoFit/>
+          </a:bodyPr>
+          <a:lstStyle/>
+          <a:p>
+            <a:r>
+              <a:rPr lang="en-GB" sz="1400" b="1" dirty="0"/>
+              <a:t>STARTOFMONTH =&gt; </a:t>
+            </a:r>
+            <a:r>
+              <a:rPr lang="en-GB" sz="1400" dirty="0"/>
+              <a:t>1 Aug</a:t>
+            </a:r>
+          </a:p>
+        </p:txBody>
+      </p:sp>
+      <p:sp>
+        <p:nvSpPr>
+          <p:cNvPr id="11" name="TextBox 10">
+            <a:extLst>
+              <a:ext uri="{FF2B5EF4-FFF2-40B4-BE49-F238E27FC236}">
+                <a16:creationId xmlns:a16="http://schemas.microsoft.com/office/drawing/2014/main" id="{BCB04213-7563-42F4-9C5F-E2722D16A598}"/>
+              </a:ext>
+            </a:extLst>
+          </p:cNvPr>
+          <p:cNvSpPr txBox="1"/>
+          <p:nvPr/>
+        </p:nvSpPr>
+        <p:spPr>
+          <a:xfrm>
+            <a:off x="7534466" y="5810415"/>
+            <a:ext cx="2383975" cy="307777"/>
+          </a:xfrm>
+          <a:prstGeom prst="rect">
+            <a:avLst/>
+          </a:prstGeom>
+          <a:noFill/>
+          <a:ln>
+            <a:solidFill>
+              <a:schemeClr val="tx1"/>
+            </a:solidFill>
+          </a:ln>
+        </p:spPr>
+        <p:txBody>
+          <a:bodyPr wrap="square" rtlCol="0">
+            <a:spAutoFit/>
+          </a:bodyPr>
+          <a:lstStyle/>
+          <a:p>
+            <a:r>
+              <a:rPr lang="en-GB" sz="1400" b="1" dirty="0"/>
+              <a:t>ENDOFMONTH=&gt; </a:t>
+            </a:r>
+            <a:r>
+              <a:rPr lang="en-GB" sz="1400" dirty="0"/>
+              <a:t>31 Aug</a:t>
+            </a:r>
+          </a:p>
+        </p:txBody>
+      </p:sp>
+      <p:cxnSp>
+        <p:nvCxnSpPr>
+          <p:cNvPr id="12" name="Connector: Elbow 11">
+            <a:extLst>
+              <a:ext uri="{FF2B5EF4-FFF2-40B4-BE49-F238E27FC236}">
+                <a16:creationId xmlns:a16="http://schemas.microsoft.com/office/drawing/2014/main" id="{782A64D3-06FB-4B56-A4F8-464DBEEFD186}"/>
+              </a:ext>
+            </a:extLst>
+          </p:cNvPr>
+          <p:cNvCxnSpPr>
+            <a:cxnSpLocks/>
+          </p:cNvCxnSpPr>
+          <p:nvPr/>
+        </p:nvCxnSpPr>
+        <p:spPr>
+          <a:xfrm rot="5400000">
+            <a:off x="5564783" y="5033486"/>
+            <a:ext cx="903820" cy="650039"/>
+          </a:xfrm>
+          <a:prstGeom prst="bentConnector3">
+            <a:avLst>
+              <a:gd name="adj1" fmla="val 50000"/>
+            </a:avLst>
+          </a:prstGeom>
+          <a:ln w="28575">
+            <a:solidFill>
+              <a:srgbClr val="FFC000"/>
+            </a:solidFill>
+            <a:tailEnd type="triangle"/>
+          </a:ln>
+        </p:spPr>
+        <p:style>
+          <a:lnRef idx="1">
+            <a:schemeClr val="accent1"/>
+          </a:lnRef>
+          <a:fillRef idx="0">
+            <a:schemeClr val="accent1"/>
+          </a:fillRef>
+          <a:effectRef idx="0">
+            <a:schemeClr val="accent1"/>
+          </a:effectRef>
+          <a:fontRef idx="minor">
+            <a:schemeClr val="tx1"/>
+          </a:fontRef>
+        </p:style>
+      </p:cxnSp>
+      <p:cxnSp>
+        <p:nvCxnSpPr>
+          <p:cNvPr id="15" name="Connector: Elbow 14">
+            <a:extLst>
+              <a:ext uri="{FF2B5EF4-FFF2-40B4-BE49-F238E27FC236}">
+                <a16:creationId xmlns:a16="http://schemas.microsoft.com/office/drawing/2014/main" id="{31E70D13-CAFA-43BC-8184-38BFFEA6B6C5}"/>
+              </a:ext>
+            </a:extLst>
+          </p:cNvPr>
+          <p:cNvCxnSpPr>
+            <a:cxnSpLocks/>
+          </p:cNvCxnSpPr>
+          <p:nvPr/>
+        </p:nvCxnSpPr>
+        <p:spPr>
+          <a:xfrm rot="16200000" flipH="1">
+            <a:off x="7822201" y="4931437"/>
+            <a:ext cx="903819" cy="854138"/>
+          </a:xfrm>
+          <a:prstGeom prst="bentConnector3">
+            <a:avLst>
+              <a:gd name="adj1" fmla="val 50000"/>
+            </a:avLst>
+          </a:prstGeom>
+          <a:ln w="28575">
+            <a:solidFill>
+              <a:srgbClr val="FFC000"/>
+            </a:solidFill>
+            <a:tailEnd type="triangle"/>
+          </a:ln>
+        </p:spPr>
+        <p:style>
+          <a:lnRef idx="1">
+            <a:schemeClr val="accent1"/>
+          </a:lnRef>
+          <a:fillRef idx="0">
+            <a:schemeClr val="accent1"/>
+          </a:fillRef>
+          <a:effectRef idx="0">
+            <a:schemeClr val="accent1"/>
+          </a:effectRef>
+          <a:fontRef idx="minor">
+            <a:schemeClr val="tx1"/>
+          </a:fontRef>
+        </p:style>
+      </p:cxnSp>
+    </p:spTree>
+    <p:extLst>
+      <p:ext uri="{BB962C8B-B14F-4D97-AF65-F5344CB8AC3E}">
+        <p14:creationId xmlns:p14="http://schemas.microsoft.com/office/powerpoint/2010/main" val="1288694114"/>
+      </p:ext>
+    </p:extLst>
+  </p:cSld>
+  <p:clrMapOvr>
+    <a:masterClrMapping/>
+  </p:clrMapOvr>
+</p:sld>
+</file>
+
+<file path=ppt/slides/slide15.xml><?xml version="1.0" encoding="utf-8"?>
+<p:sld xmlns:a="http://schemas.openxmlformats.org/drawingml/2006/main" xmlns:r="http://schemas.openxmlformats.org/officeDocument/2006/relationships" xmlns:p="http://schemas.openxmlformats.org/presentationml/2006/main">
+  <p:cSld>
+    <p:spTree>
+      <p:nvGrpSpPr>
+        <p:cNvPr id="1" name=""/>
+        <p:cNvGrpSpPr/>
+        <p:nvPr/>
+      </p:nvGrpSpPr>
+      <p:grpSpPr>
+        <a:xfrm>
+          <a:off x="0" y="0"/>
+          <a:ext cx="0" cy="0"/>
+          <a:chOff x="0" y="0"/>
+          <a:chExt cx="0" cy="0"/>
+        </a:xfrm>
+      </p:grpSpPr>
+      <p:pic>
+        <p:nvPicPr>
+          <p:cNvPr id="5" name="Picture 4">
+            <a:extLst>
+              <a:ext uri="{FF2B5EF4-FFF2-40B4-BE49-F238E27FC236}">
+                <a16:creationId xmlns:a16="http://schemas.microsoft.com/office/drawing/2014/main" id="{35676DBA-D9AA-4979-B3C9-64FCD72F4797}"/>
+              </a:ext>
+            </a:extLst>
+          </p:cNvPr>
+          <p:cNvPicPr>
+            <a:picLocks noChangeAspect="1"/>
+          </p:cNvPicPr>
+          <p:nvPr/>
+        </p:nvPicPr>
+        <p:blipFill>
+          <a:blip r:embed="rId2"/>
+          <a:stretch>
+            <a:fillRect/>
+          </a:stretch>
+        </p:blipFill>
+        <p:spPr>
+          <a:xfrm>
+            <a:off x="761670" y="60912"/>
+            <a:ext cx="11380237" cy="6369417"/>
+          </a:xfrm>
+          <a:prstGeom prst="rect">
+            <a:avLst/>
+          </a:prstGeom>
+        </p:spPr>
+      </p:pic>
+      <p:sp>
+        <p:nvSpPr>
+          <p:cNvPr id="6" name="TextBox 5">
+            <a:extLst>
+              <a:ext uri="{FF2B5EF4-FFF2-40B4-BE49-F238E27FC236}">
+                <a16:creationId xmlns:a16="http://schemas.microsoft.com/office/drawing/2014/main" id="{90B4AE95-82F6-4476-A94B-9152118D2E06}"/>
+              </a:ext>
+            </a:extLst>
+          </p:cNvPr>
+          <p:cNvSpPr txBox="1"/>
+          <p:nvPr/>
+        </p:nvSpPr>
+        <p:spPr>
+          <a:xfrm>
+            <a:off x="8787948" y="3245621"/>
+            <a:ext cx="3096132" cy="523220"/>
+          </a:xfrm>
+          <a:prstGeom prst="rect">
+            <a:avLst/>
+          </a:prstGeom>
+          <a:noFill/>
+          <a:ln>
+            <a:solidFill>
+              <a:schemeClr val="tx1"/>
+            </a:solidFill>
+          </a:ln>
+        </p:spPr>
+        <p:txBody>
+          <a:bodyPr wrap="square" rtlCol="0">
+            <a:spAutoFit/>
+          </a:bodyPr>
+          <a:lstStyle/>
+          <a:p>
+            <a:r>
+              <a:rPr lang="en-GB" sz="1400" dirty="0"/>
+              <a:t>Slicer on </a:t>
+            </a:r>
+            <a:r>
+              <a:rPr lang="en-GB" sz="1400" b="1" dirty="0"/>
+              <a:t>Financial Year</a:t>
+            </a:r>
+            <a:r>
+              <a:rPr lang="en-GB" sz="1400" dirty="0"/>
+              <a:t> column of of the</a:t>
+            </a:r>
+            <a:r>
+              <a:rPr lang="en-GB" sz="1400" b="1" dirty="0"/>
+              <a:t> </a:t>
+            </a:r>
+            <a:r>
+              <a:rPr lang="en-GB" sz="1400" b="1" dirty="0" err="1"/>
+              <a:t>MyCalendar</a:t>
+            </a:r>
+            <a:r>
+              <a:rPr lang="en-GB" sz="1400" b="1" dirty="0"/>
+              <a:t> </a:t>
+            </a:r>
+            <a:r>
+              <a:rPr lang="en-GB" sz="1400" dirty="0"/>
+              <a:t>table</a:t>
+            </a:r>
+            <a:endParaRPr lang="en-GB" sz="1400" b="1" dirty="0"/>
+          </a:p>
+        </p:txBody>
+      </p:sp>
+      <p:cxnSp>
+        <p:nvCxnSpPr>
+          <p:cNvPr id="7" name="Straight Arrow Connector 6">
+            <a:extLst>
+              <a:ext uri="{FF2B5EF4-FFF2-40B4-BE49-F238E27FC236}">
+                <a16:creationId xmlns:a16="http://schemas.microsoft.com/office/drawing/2014/main" id="{7F362545-0DE3-4A2E-BC2D-9F4E1AC1A56B}"/>
+              </a:ext>
+            </a:extLst>
+          </p:cNvPr>
+          <p:cNvCxnSpPr>
+            <a:cxnSpLocks/>
+          </p:cNvCxnSpPr>
+          <p:nvPr/>
+        </p:nvCxnSpPr>
+        <p:spPr>
+          <a:xfrm flipV="1">
+            <a:off x="10258262" y="1392481"/>
+            <a:ext cx="0" cy="1853140"/>
+          </a:xfrm>
+          <a:prstGeom prst="straightConnector1">
+            <a:avLst/>
+          </a:prstGeom>
+          <a:ln w="38100">
+            <a:solidFill>
+              <a:srgbClr val="00B0F0"/>
+            </a:solidFill>
+            <a:tailEnd type="triangle"/>
+          </a:ln>
+        </p:spPr>
+        <p:style>
+          <a:lnRef idx="1">
+            <a:schemeClr val="accent1"/>
+          </a:lnRef>
+          <a:fillRef idx="0">
+            <a:schemeClr val="accent1"/>
+          </a:fillRef>
+          <a:effectRef idx="0">
+            <a:schemeClr val="accent1"/>
+          </a:effectRef>
+          <a:fontRef idx="minor">
+            <a:schemeClr val="tx1"/>
+          </a:fontRef>
+        </p:style>
+      </p:cxnSp>
+      <p:sp>
+        <p:nvSpPr>
+          <p:cNvPr id="8" name="TextBox 7">
+            <a:extLst>
+              <a:ext uri="{FF2B5EF4-FFF2-40B4-BE49-F238E27FC236}">
+                <a16:creationId xmlns:a16="http://schemas.microsoft.com/office/drawing/2014/main" id="{1C4EAAFE-9C47-4478-98BA-78278FA8CE3F}"/>
+              </a:ext>
+            </a:extLst>
+          </p:cNvPr>
+          <p:cNvSpPr txBox="1"/>
+          <p:nvPr/>
+        </p:nvSpPr>
+        <p:spPr>
+          <a:xfrm>
+            <a:off x="3957811" y="128246"/>
+            <a:ext cx="3096132" cy="954107"/>
+          </a:xfrm>
+          <a:prstGeom prst="rect">
+            <a:avLst/>
+          </a:prstGeom>
+          <a:noFill/>
+          <a:ln>
+            <a:solidFill>
+              <a:schemeClr val="tx1"/>
+            </a:solidFill>
+          </a:ln>
+        </p:spPr>
+        <p:txBody>
+          <a:bodyPr wrap="square" rtlCol="0">
+            <a:spAutoFit/>
+          </a:bodyPr>
+          <a:lstStyle/>
+          <a:p>
+            <a:r>
+              <a:rPr lang="en-GB" sz="1400" dirty="0"/>
+              <a:t>Visual hierarchy using the </a:t>
+            </a:r>
+          </a:p>
+          <a:p>
+            <a:pPr marL="285750" indent="-285750">
+              <a:buFont typeface="Arial" panose="020B0604020202020204" pitchFamily="34" charset="0"/>
+              <a:buChar char="•"/>
+            </a:pPr>
+            <a:r>
+              <a:rPr lang="en-GB" sz="1400" dirty="0"/>
+              <a:t>Financial Year</a:t>
+            </a:r>
+          </a:p>
+          <a:p>
+            <a:pPr marL="285750" indent="-285750">
+              <a:buFont typeface="Arial" panose="020B0604020202020204" pitchFamily="34" charset="0"/>
+              <a:buChar char="•"/>
+            </a:pPr>
+            <a:r>
+              <a:rPr lang="en-GB" sz="1400" dirty="0"/>
+              <a:t>Financial Month</a:t>
+            </a:r>
+            <a:endParaRPr lang="en-GB" sz="1400" b="1" dirty="0"/>
+          </a:p>
+          <a:p>
+            <a:r>
+              <a:rPr lang="en-GB" sz="1400" dirty="0"/>
+              <a:t>columns of the</a:t>
+            </a:r>
+            <a:r>
+              <a:rPr lang="en-GB" sz="1400" b="1" dirty="0"/>
+              <a:t> </a:t>
+            </a:r>
+            <a:r>
+              <a:rPr lang="en-GB" sz="1400" b="1" dirty="0" err="1"/>
+              <a:t>MyCalendar</a:t>
+            </a:r>
+            <a:r>
+              <a:rPr lang="en-GB" sz="1400" b="1" dirty="0"/>
+              <a:t> </a:t>
+            </a:r>
+            <a:r>
+              <a:rPr lang="en-GB" sz="1400" dirty="0"/>
+              <a:t>table</a:t>
+            </a:r>
+            <a:endParaRPr lang="en-GB" sz="1400" b="1" dirty="0"/>
+          </a:p>
+        </p:txBody>
+      </p:sp>
+      <p:sp>
+        <p:nvSpPr>
+          <p:cNvPr id="9" name="Rectangle 8">
+            <a:extLst>
+              <a:ext uri="{FF2B5EF4-FFF2-40B4-BE49-F238E27FC236}">
+                <a16:creationId xmlns:a16="http://schemas.microsoft.com/office/drawing/2014/main" id="{535557FC-3E01-4CB1-BE6B-B2066BB2565C}"/>
+              </a:ext>
+            </a:extLst>
+          </p:cNvPr>
+          <p:cNvSpPr/>
+          <p:nvPr/>
+        </p:nvSpPr>
+        <p:spPr>
+          <a:xfrm>
+            <a:off x="2127382" y="381964"/>
+            <a:ext cx="1194318" cy="3602208"/>
+          </a:xfrm>
+          <a:prstGeom prst="rect">
+            <a:avLst/>
+          </a:prstGeom>
+          <a:noFill/>
+          <a:ln w="28575">
+            <a:solidFill>
+              <a:srgbClr val="FFC000"/>
+            </a:solidFill>
+          </a:ln>
+        </p:spPr>
+        <p:style>
+          <a:lnRef idx="2">
+            <a:schemeClr val="accent1">
+              <a:shade val="50000"/>
+            </a:schemeClr>
+          </a:lnRef>
+          <a:fillRef idx="1">
+            <a:schemeClr val="accent1"/>
+          </a:fillRef>
+          <a:effectRef idx="0">
+            <a:schemeClr val="accent1"/>
+          </a:effectRef>
+          <a:fontRef idx="minor">
+            <a:schemeClr val="lt1"/>
+          </a:fontRef>
+        </p:style>
+        <p:txBody>
+          <a:bodyPr rtlCol="0" anchor="ctr"/>
+          <a:lstStyle/>
+          <a:p>
+            <a:pPr algn="ctr"/>
+            <a:endParaRPr lang="en-GB"/>
+          </a:p>
+        </p:txBody>
+      </p:sp>
+      <p:sp>
+        <p:nvSpPr>
+          <p:cNvPr id="10" name="TextBox 9">
+            <a:extLst>
+              <a:ext uri="{FF2B5EF4-FFF2-40B4-BE49-F238E27FC236}">
+                <a16:creationId xmlns:a16="http://schemas.microsoft.com/office/drawing/2014/main" id="{DEF6F0EF-C8F7-4690-A0E5-595C73204E4E}"/>
+              </a:ext>
+            </a:extLst>
+          </p:cNvPr>
+          <p:cNvSpPr txBox="1"/>
+          <p:nvPr/>
+        </p:nvSpPr>
+        <p:spPr>
+          <a:xfrm>
+            <a:off x="3924750" y="2165162"/>
+            <a:ext cx="3732237" cy="307777"/>
+          </a:xfrm>
+          <a:prstGeom prst="rect">
+            <a:avLst/>
+          </a:prstGeom>
+          <a:noFill/>
+          <a:ln>
+            <a:solidFill>
+              <a:schemeClr val="tx1"/>
+            </a:solidFill>
+          </a:ln>
+        </p:spPr>
+        <p:txBody>
+          <a:bodyPr wrap="square" rtlCol="0">
+            <a:spAutoFit/>
+          </a:bodyPr>
+          <a:lstStyle/>
+          <a:p>
+            <a:r>
+              <a:rPr lang="en-GB" sz="1400" dirty="0"/>
+              <a:t>Custom measure </a:t>
+            </a:r>
+            <a:r>
+              <a:rPr lang="en-GB" sz="1400" b="1" dirty="0">
+                <a:effectLst/>
+                <a:latin typeface="Arial" panose="020B0604020202020204" pitchFamily="34" charset="0"/>
+              </a:rPr>
+              <a:t>% </a:t>
+            </a:r>
+            <a:r>
+              <a:rPr lang="en-GB" sz="1400" b="1" dirty="0" err="1">
+                <a:effectLst/>
+                <a:latin typeface="Arial" panose="020B0604020202020204" pitchFamily="34" charset="0"/>
+              </a:rPr>
+              <a:t>OfAnnualSalesInPeriod</a:t>
+            </a:r>
+            <a:endParaRPr lang="en-GB" sz="1400" b="1" dirty="0"/>
+          </a:p>
+        </p:txBody>
+      </p:sp>
+      <p:cxnSp>
+        <p:nvCxnSpPr>
+          <p:cNvPr id="11" name="Connector: Elbow 10">
+            <a:extLst>
+              <a:ext uri="{FF2B5EF4-FFF2-40B4-BE49-F238E27FC236}">
+                <a16:creationId xmlns:a16="http://schemas.microsoft.com/office/drawing/2014/main" id="{7E0395A8-C9AD-4C05-A02E-8B5D31072CF0}"/>
+              </a:ext>
+            </a:extLst>
+          </p:cNvPr>
+          <p:cNvCxnSpPr>
+            <a:cxnSpLocks/>
+          </p:cNvCxnSpPr>
+          <p:nvPr/>
+        </p:nvCxnSpPr>
+        <p:spPr>
+          <a:xfrm rot="10800000" flipV="1">
+            <a:off x="2845837" y="2319050"/>
+            <a:ext cx="1222310" cy="699404"/>
+          </a:xfrm>
+          <a:prstGeom prst="bentConnector3">
+            <a:avLst>
+              <a:gd name="adj1" fmla="val 50000"/>
+            </a:avLst>
+          </a:prstGeom>
+          <a:ln w="38100">
+            <a:solidFill>
+              <a:srgbClr val="FFC000"/>
+            </a:solidFill>
+            <a:tailEnd type="triangle"/>
+          </a:ln>
+        </p:spPr>
+        <p:style>
+          <a:lnRef idx="1">
+            <a:schemeClr val="accent1"/>
+          </a:lnRef>
+          <a:fillRef idx="0">
+            <a:schemeClr val="accent1"/>
+          </a:fillRef>
+          <a:effectRef idx="0">
+            <a:schemeClr val="accent1"/>
+          </a:effectRef>
+          <a:fontRef idx="minor">
+            <a:schemeClr val="tx1"/>
+          </a:fontRef>
+        </p:style>
+      </p:cxnSp>
+      <p:cxnSp>
+        <p:nvCxnSpPr>
+          <p:cNvPr id="16" name="Connector: Elbow 15">
+            <a:extLst>
+              <a:ext uri="{FF2B5EF4-FFF2-40B4-BE49-F238E27FC236}">
+                <a16:creationId xmlns:a16="http://schemas.microsoft.com/office/drawing/2014/main" id="{ADDAFFF0-9B71-4D60-A6ED-DA021E3EF561}"/>
+              </a:ext>
+            </a:extLst>
+          </p:cNvPr>
+          <p:cNvCxnSpPr>
+            <a:cxnSpLocks/>
+          </p:cNvCxnSpPr>
+          <p:nvPr/>
+        </p:nvCxnSpPr>
+        <p:spPr>
+          <a:xfrm rot="5400000">
+            <a:off x="4885058" y="3614132"/>
+            <a:ext cx="2486053" cy="64167"/>
+          </a:xfrm>
+          <a:prstGeom prst="bentConnector3">
+            <a:avLst>
+              <a:gd name="adj1" fmla="val 50000"/>
+            </a:avLst>
+          </a:prstGeom>
+          <a:ln w="38100">
+            <a:solidFill>
+              <a:srgbClr val="FFC000"/>
+            </a:solidFill>
+            <a:tailEnd type="triangle"/>
+          </a:ln>
+        </p:spPr>
+        <p:style>
+          <a:lnRef idx="1">
+            <a:schemeClr val="accent1"/>
+          </a:lnRef>
+          <a:fillRef idx="0">
+            <a:schemeClr val="accent1"/>
+          </a:fillRef>
+          <a:effectRef idx="0">
+            <a:schemeClr val="accent1"/>
+          </a:effectRef>
+          <a:fontRef idx="minor">
+            <a:schemeClr val="tx1"/>
+          </a:fontRef>
+        </p:style>
+      </p:cxnSp>
+      <p:sp>
+        <p:nvSpPr>
+          <p:cNvPr id="18" name="Rectangle 17">
+            <a:extLst>
+              <a:ext uri="{FF2B5EF4-FFF2-40B4-BE49-F238E27FC236}">
+                <a16:creationId xmlns:a16="http://schemas.microsoft.com/office/drawing/2014/main" id="{B4EFB556-8D7E-44D0-8352-560FD95B6AEC}"/>
+              </a:ext>
+            </a:extLst>
+          </p:cNvPr>
+          <p:cNvSpPr/>
+          <p:nvPr/>
+        </p:nvSpPr>
+        <p:spPr>
+          <a:xfrm>
+            <a:off x="1119673" y="1082679"/>
+            <a:ext cx="947058" cy="886081"/>
+          </a:xfrm>
+          <a:prstGeom prst="rect">
+            <a:avLst/>
+          </a:prstGeom>
+          <a:noFill/>
+          <a:ln w="28575">
+            <a:solidFill>
+              <a:srgbClr val="00B0F0"/>
+            </a:solidFill>
+          </a:ln>
+        </p:spPr>
+        <p:style>
+          <a:lnRef idx="2">
+            <a:schemeClr val="accent1">
+              <a:shade val="50000"/>
+            </a:schemeClr>
+          </a:lnRef>
+          <a:fillRef idx="1">
+            <a:schemeClr val="accent1"/>
+          </a:fillRef>
+          <a:effectRef idx="0">
+            <a:schemeClr val="accent1"/>
+          </a:effectRef>
+          <a:fontRef idx="minor">
+            <a:schemeClr val="lt1"/>
+          </a:fontRef>
+        </p:style>
+        <p:txBody>
+          <a:bodyPr rtlCol="0" anchor="ctr"/>
+          <a:lstStyle/>
+          <a:p>
+            <a:pPr algn="ctr"/>
+            <a:endParaRPr lang="en-GB"/>
+          </a:p>
+        </p:txBody>
+      </p:sp>
+      <p:cxnSp>
+        <p:nvCxnSpPr>
+          <p:cNvPr id="19" name="Connector: Elbow 18">
+            <a:extLst>
+              <a:ext uri="{FF2B5EF4-FFF2-40B4-BE49-F238E27FC236}">
+                <a16:creationId xmlns:a16="http://schemas.microsoft.com/office/drawing/2014/main" id="{5FFD5590-E550-45DF-A71E-9F717ADECA38}"/>
+              </a:ext>
+            </a:extLst>
+          </p:cNvPr>
+          <p:cNvCxnSpPr>
+            <a:cxnSpLocks/>
+            <a:endCxn id="18" idx="3"/>
+          </p:cNvCxnSpPr>
+          <p:nvPr/>
+        </p:nvCxnSpPr>
+        <p:spPr>
+          <a:xfrm rot="10800000" flipV="1">
+            <a:off x="2066731" y="564156"/>
+            <a:ext cx="2001416" cy="961564"/>
+          </a:xfrm>
+          <a:prstGeom prst="bentConnector3">
+            <a:avLst>
+              <a:gd name="adj1" fmla="val 80303"/>
+            </a:avLst>
+          </a:prstGeom>
+          <a:ln w="38100">
+            <a:solidFill>
+              <a:srgbClr val="00B0F0"/>
+            </a:solidFill>
+            <a:tailEnd type="triangle"/>
+          </a:ln>
+        </p:spPr>
+        <p:style>
+          <a:lnRef idx="1">
+            <a:schemeClr val="accent1"/>
+          </a:lnRef>
+          <a:fillRef idx="0">
+            <a:schemeClr val="accent1"/>
+          </a:fillRef>
+          <a:effectRef idx="0">
+            <a:schemeClr val="accent1"/>
+          </a:effectRef>
+          <a:fontRef idx="minor">
+            <a:schemeClr val="tx1"/>
+          </a:fontRef>
+        </p:style>
+      </p:cxnSp>
+      <p:cxnSp>
+        <p:nvCxnSpPr>
+          <p:cNvPr id="23" name="Straight Arrow Connector 22">
+            <a:extLst>
+              <a:ext uri="{FF2B5EF4-FFF2-40B4-BE49-F238E27FC236}">
+                <a16:creationId xmlns:a16="http://schemas.microsoft.com/office/drawing/2014/main" id="{FCB34B8A-5715-4C8A-BC0A-7F8DEA23FE2B}"/>
+              </a:ext>
+            </a:extLst>
+          </p:cNvPr>
+          <p:cNvCxnSpPr>
+            <a:cxnSpLocks/>
+          </p:cNvCxnSpPr>
+          <p:nvPr/>
+        </p:nvCxnSpPr>
+        <p:spPr>
+          <a:xfrm>
+            <a:off x="1144222" y="6689014"/>
+            <a:ext cx="3018408" cy="0"/>
+          </a:xfrm>
+          <a:prstGeom prst="straightConnector1">
+            <a:avLst/>
+          </a:prstGeom>
+          <a:ln w="38100">
+            <a:tailEnd type="triangle"/>
+          </a:ln>
+        </p:spPr>
+        <p:style>
+          <a:lnRef idx="1">
+            <a:schemeClr val="accent1"/>
+          </a:lnRef>
+          <a:fillRef idx="0">
+            <a:schemeClr val="accent1"/>
+          </a:fillRef>
+          <a:effectRef idx="0">
+            <a:schemeClr val="accent1"/>
+          </a:effectRef>
+          <a:fontRef idx="minor">
+            <a:schemeClr val="tx1"/>
+          </a:fontRef>
+        </p:style>
+      </p:cxnSp>
+      <p:sp>
+        <p:nvSpPr>
+          <p:cNvPr id="24" name="TextBox 23">
+            <a:extLst>
+              <a:ext uri="{FF2B5EF4-FFF2-40B4-BE49-F238E27FC236}">
+                <a16:creationId xmlns:a16="http://schemas.microsoft.com/office/drawing/2014/main" id="{6A59AA7D-C8B6-48DA-BA73-DAD5896A4E8E}"/>
+              </a:ext>
+            </a:extLst>
+          </p:cNvPr>
+          <p:cNvSpPr txBox="1"/>
+          <p:nvPr/>
+        </p:nvSpPr>
+        <p:spPr>
+          <a:xfrm>
+            <a:off x="4805265" y="6417735"/>
+            <a:ext cx="3732236" cy="369332"/>
+          </a:xfrm>
+          <a:prstGeom prst="rect">
+            <a:avLst/>
+          </a:prstGeom>
+          <a:noFill/>
+        </p:spPr>
+        <p:txBody>
+          <a:bodyPr wrap="square" rtlCol="0">
+            <a:spAutoFit/>
+          </a:bodyPr>
+          <a:lstStyle/>
+          <a:p>
+            <a:r>
+              <a:rPr lang="en-GB" b="1" dirty="0"/>
+              <a:t>Axis</a:t>
+            </a:r>
+            <a:r>
+              <a:rPr lang="en-GB" dirty="0"/>
+              <a:t>=</a:t>
+            </a:r>
+            <a:r>
+              <a:rPr lang="en-GB" dirty="0" err="1"/>
+              <a:t>MyCalendar</a:t>
+            </a:r>
+            <a:r>
+              <a:rPr lang="en-GB" dirty="0"/>
+              <a:t>[</a:t>
+            </a:r>
+            <a:r>
+              <a:rPr lang="en-GB" dirty="0" err="1"/>
+              <a:t>FinancialMonth</a:t>
+            </a:r>
+            <a:r>
+              <a:rPr lang="en-GB" dirty="0"/>
+              <a:t>]</a:t>
+            </a:r>
+          </a:p>
+        </p:txBody>
+      </p:sp>
+    </p:spTree>
+    <p:extLst>
+      <p:ext uri="{BB962C8B-B14F-4D97-AF65-F5344CB8AC3E}">
+        <p14:creationId xmlns:p14="http://schemas.microsoft.com/office/powerpoint/2010/main" val="389864653"/>
+      </p:ext>
+    </p:extLst>
+  </p:cSld>
+  <p:clrMapOvr>
+    <a:masterClrMapping/>
+  </p:clrMapOvr>
+</p:sld>
+</file>
+
 <file path=ppt/slides/slide2.xml><?xml version="1.0" encoding="utf-8"?>
 <p:sld xmlns:a="http://schemas.openxmlformats.org/drawingml/2006/main" xmlns:r="http://schemas.openxmlformats.org/officeDocument/2006/relationships" xmlns:p="http://schemas.openxmlformats.org/presentationml/2006/main">
   <p:cSld>

</xml_diff>